<commit_message>
Chỉnh sửa bài giữa kì
</commit_message>
<xml_diff>
--- a/Documents/TongHop/ProductBacklog/Nhom_3_Tuan_3.pptx
+++ b/Documents/TongHop/ProductBacklog/Nhom_3_Tuan_3.pptx
@@ -375,7 +375,7 @@
           <a:p>
             <a:fld id="{9184DA70-C731-4C70-880D-CCD4705E623C}" type="datetime1">
               <a:rPr lang="en-US" smtClean="0"/>
-              <a:t>12/12/2019</a:t>
+              <a:t>12/17/2019</a:t>
             </a:fld>
             <a:endParaRPr lang="en-US" dirty="0"/>
           </a:p>
@@ -563,7 +563,7 @@
           <a:p>
             <a:fld id="{B612A279-0833-481D-8C56-F67FD0AC6C50}" type="datetime1">
               <a:rPr lang="en-US" smtClean="0"/>
-              <a:t>12/12/2019</a:t>
+              <a:t>12/17/2019</a:t>
             </a:fld>
             <a:endParaRPr lang="en-US" dirty="0"/>
           </a:p>
@@ -805,7 +805,7 @@
           <a:p>
             <a:fld id="{6587DA83-5663-4C9C-B9AA-0B40A3DAFF81}" type="datetime1">
               <a:rPr lang="en-US" smtClean="0"/>
-              <a:t>12/12/2019</a:t>
+              <a:t>12/17/2019</a:t>
             </a:fld>
             <a:endParaRPr lang="en-US" dirty="0"/>
           </a:p>
@@ -993,7 +993,7 @@
           <a:p>
             <a:fld id="{4BE1D723-8F53-4F53-90B0-1982A396982E}" type="datetime1">
               <a:rPr lang="en-US" smtClean="0"/>
-              <a:t>12/12/2019</a:t>
+              <a:t>12/17/2019</a:t>
             </a:fld>
             <a:endParaRPr lang="en-US" dirty="0"/>
           </a:p>
@@ -1366,7 +1366,7 @@
           <a:p>
             <a:fld id="{97669AF7-7BEB-44E4-9852-375E34362B5B}" type="datetime1">
               <a:rPr lang="en-US" smtClean="0"/>
-              <a:t>12/12/2019</a:t>
+              <a:t>12/17/2019</a:t>
             </a:fld>
             <a:endParaRPr lang="en-US" dirty="0"/>
           </a:p>
@@ -1621,7 +1621,7 @@
           <a:p>
             <a:fld id="{BAAAC38D-0552-4C82-B593-E6124DFADBE2}" type="datetime1">
               <a:rPr lang="en-US" smtClean="0"/>
-              <a:t>12/12/2019</a:t>
+              <a:t>12/17/2019</a:t>
             </a:fld>
             <a:endParaRPr lang="en-US" dirty="0"/>
           </a:p>
@@ -2018,7 +2018,7 @@
           <a:p>
             <a:fld id="{D9DF0F1C-5577-4ACB-BB62-DF8F3C494C7E}" type="datetime1">
               <a:rPr lang="en-US" smtClean="0"/>
-              <a:t>12/12/2019</a:t>
+              <a:t>12/17/2019</a:t>
             </a:fld>
             <a:endParaRPr lang="en-US" dirty="0"/>
           </a:p>
@@ -2154,7 +2154,7 @@
           <a:p>
             <a:fld id="{1775B394-D9F9-4F0C-B15D-605F45CB9E9F}" type="datetime1">
               <a:rPr lang="en-US" smtClean="0"/>
-              <a:t>12/12/2019</a:t>
+              <a:t>12/17/2019</a:t>
             </a:fld>
             <a:endParaRPr lang="en-US" dirty="0"/>
           </a:p>
@@ -2311,7 +2311,7 @@
           <a:p>
             <a:fld id="{39667345-2558-425A-8533-9BFDBCE15005}" type="datetime1">
               <a:rPr lang="en-US" smtClean="0"/>
-              <a:t>12/12/2019</a:t>
+              <a:t>12/17/2019</a:t>
             </a:fld>
             <a:endParaRPr lang="en-US" dirty="0"/>
           </a:p>
@@ -2640,7 +2640,7 @@
           <a:p>
             <a:fld id="{92BEA474-078D-4E9B-9B14-09A87B19DC46}" type="datetime1">
               <a:rPr lang="en-US" smtClean="0"/>
-              <a:t>12/12/2019</a:t>
+              <a:t>12/17/2019</a:t>
             </a:fld>
             <a:endParaRPr lang="en-US" dirty="0"/>
           </a:p>
@@ -2990,7 +2990,7 @@
           <a:p>
             <a:fld id="{4907D986-8816-4272-A432-0437A28A9828}" type="datetime1">
               <a:rPr lang="en-US" smtClean="0"/>
-              <a:t>12/12/2019</a:t>
+              <a:t>12/17/2019</a:t>
             </a:fld>
             <a:endParaRPr lang="en-US" dirty="0"/>
           </a:p>
@@ -3251,7 +3251,7 @@
           <a:p>
             <a:fld id="{62D6E202-B606-4609-B914-27C9371A1F6D}" type="datetime1">
               <a:rPr lang="en-US" smtClean="0"/>
-              <a:t>12/12/2019</a:t>
+              <a:t>12/17/2019</a:t>
             </a:fld>
             <a:endParaRPr lang="en-US" dirty="0"/>
           </a:p>
@@ -3790,7 +3790,7 @@
                 <a16:creationId xmlns:a16="http://schemas.microsoft.com/office/drawing/2014/main" id="{A9286AD2-18A9-4868-A4E3-7A2097A20810}"/>
               </a:ext>
               <a:ext uri="{C183D7F6-B498-43B3-948B-1728B52AA6E4}">
-                <adec:decorative xmlns="" xmlns:adec="http://schemas.microsoft.com/office/drawing/2017/decorative" val="1"/>
+                <adec:decorative xmlns:adec="http://schemas.microsoft.com/office/drawing/2017/decorative" xmlns="" val="1"/>
               </a:ext>
             </a:extLst>
           </p:cNvPr>
@@ -4165,7 +4165,7 @@
                 <a16:creationId xmlns:a16="http://schemas.microsoft.com/office/drawing/2014/main" id="{E7A7CD63-7EC3-44F3-95D0-595C4019FF24}"/>
               </a:ext>
               <a:ext uri="{C183D7F6-B498-43B3-948B-1728B52AA6E4}">
-                <adec:decorative xmlns="" xmlns:adec="http://schemas.microsoft.com/office/drawing/2017/decorative" val="1"/>
+                <adec:decorative xmlns:adec="http://schemas.microsoft.com/office/drawing/2017/decorative" xmlns="" val="1"/>
               </a:ext>
             </a:extLst>
           </p:cNvPr>
@@ -10302,7 +10302,7 @@
                     <a:p>
                       <a:pPr algn="l" fontAlgn="b"/>
                       <a:r>
-                        <a:rPr lang="en-US" sz="1400" b="0" i="0" u="none" strike="noStrike">
+                        <a:rPr lang="en-US" sz="1400" b="0" i="0" u="none" strike="noStrike" dirty="0">
                           <a:solidFill>
                             <a:srgbClr val="FF0000"/>
                           </a:solidFill>
@@ -10492,7 +10492,7 @@
                     <a:p>
                       <a:pPr algn="r" fontAlgn="b"/>
                       <a:r>
-                        <a:rPr lang="en-US" sz="1400" b="0" i="0" u="none" strike="noStrike">
+                        <a:rPr lang="en-US" sz="1400" b="0" i="0" u="none" strike="noStrike" dirty="0">
                           <a:solidFill>
                             <a:srgbClr val="000000"/>
                           </a:solidFill>
@@ -10682,7 +10682,7 @@
                     <a:p>
                       <a:pPr algn="r" fontAlgn="b"/>
                       <a:r>
-                        <a:rPr lang="en-US" sz="1400" b="1" i="0" u="none" strike="noStrike">
+                        <a:rPr lang="en-US" sz="1400" b="1" i="0" u="none" strike="noStrike" dirty="0">
                           <a:solidFill>
                             <a:srgbClr val="000000"/>
                           </a:solidFill>
@@ -10740,7 +10740,7 @@
                     <a:p>
                       <a:pPr algn="l" fontAlgn="b"/>
                       <a:r>
-                        <a:rPr lang="en-US" sz="1400" b="1" i="0" u="none" strike="noStrike">
+                        <a:rPr lang="en-US" sz="1400" b="1" i="0" u="none" strike="noStrike" dirty="0">
                           <a:solidFill>
                             <a:srgbClr val="000000"/>
                           </a:solidFill>
@@ -10921,7 +10921,7 @@
                     <a:p>
                       <a:pPr algn="l" fontAlgn="b"/>
                       <a:r>
-                        <a:rPr lang="en-US" sz="1400" b="1" i="0" u="none" strike="noStrike">
+                        <a:rPr lang="en-US" sz="1400" b="1" i="0" u="none" strike="noStrike" dirty="0">
                           <a:solidFill>
                             <a:srgbClr val="000000"/>
                           </a:solidFill>
@@ -11102,7 +11102,7 @@
                     <a:p>
                       <a:pPr algn="l" fontAlgn="b"/>
                       <a:r>
-                        <a:rPr lang="en-US" sz="1400" b="1" i="0" u="none" strike="noStrike">
+                        <a:rPr lang="en-US" sz="1400" b="1" i="0" u="none" strike="noStrike" dirty="0">
                           <a:solidFill>
                             <a:srgbClr val="000000"/>
                           </a:solidFill>
@@ -11225,7 +11225,7 @@
                     <a:p>
                       <a:pPr algn="r" fontAlgn="b"/>
                       <a:r>
-                        <a:rPr lang="en-US" sz="1400" b="1" i="0" u="none" strike="noStrike">
+                        <a:rPr lang="en-US" sz="1400" b="1" i="0" u="none" strike="noStrike" dirty="0">
                           <a:solidFill>
                             <a:srgbClr val="000000"/>
                           </a:solidFill>
@@ -11283,7 +11283,7 @@
                     <a:p>
                       <a:pPr algn="l" fontAlgn="b"/>
                       <a:r>
-                        <a:rPr lang="en-US" sz="1400" b="1" i="0" u="none" strike="noStrike">
+                        <a:rPr lang="en-US" sz="1400" b="1" i="0" u="none" strike="noStrike" dirty="0">
                           <a:solidFill>
                             <a:srgbClr val="000000"/>
                           </a:solidFill>
@@ -11464,7 +11464,7 @@
                     <a:p>
                       <a:pPr algn="l" fontAlgn="b"/>
                       <a:r>
-                        <a:rPr lang="en-US" sz="1400" b="1" i="0" u="none" strike="noStrike">
+                        <a:rPr lang="en-US" sz="1400" b="1" i="0" u="none" strike="noStrike" dirty="0">
                           <a:solidFill>
                             <a:srgbClr val="000000"/>
                           </a:solidFill>
@@ -11777,7 +11777,7 @@
                     <a:p>
                       <a:pPr algn="l" fontAlgn="b"/>
                       <a:r>
-                        <a:rPr lang="en-US" sz="1400" b="1" i="0" u="none" strike="noStrike">
+                        <a:rPr lang="en-US" sz="1400" b="1" i="0" u="none" strike="noStrike" dirty="0">
                           <a:solidFill>
                             <a:srgbClr val="000000"/>
                           </a:solidFill>
@@ -11958,7 +11958,7 @@
                     <a:p>
                       <a:pPr algn="l" fontAlgn="b"/>
                       <a:r>
-                        <a:rPr lang="en-US" sz="1400" b="1" i="0" u="none" strike="noStrike">
+                        <a:rPr lang="en-US" sz="1400" b="1" i="0" u="none" strike="noStrike" dirty="0">
                           <a:solidFill>
                             <a:srgbClr val="000000"/>
                           </a:solidFill>
@@ -12139,7 +12139,7 @@
                     <a:p>
                       <a:pPr algn="l" fontAlgn="b"/>
                       <a:r>
-                        <a:rPr lang="en-US" sz="1400" b="1" i="0" u="none" strike="noStrike">
+                        <a:rPr lang="en-US" sz="1400" b="1" i="0" u="none" strike="noStrike" dirty="0">
                           <a:solidFill>
                             <a:srgbClr val="000000"/>
                           </a:solidFill>
@@ -12326,7 +12326,7 @@
                     <a:p>
                       <a:pPr algn="l" fontAlgn="b"/>
                       <a:r>
-                        <a:rPr lang="pt-BR" sz="1400" b="1" i="0" u="none" strike="noStrike">
+                        <a:rPr lang="pt-BR" sz="1400" b="1" i="0" u="none" strike="noStrike" dirty="0">
                           <a:solidFill>
                             <a:srgbClr val="000000"/>
                           </a:solidFill>
@@ -12516,7 +12516,7 @@
                     <a:p>
                       <a:pPr algn="l" fontAlgn="b"/>
                       <a:r>
-                        <a:rPr lang="en-US" sz="1400" b="0" i="0" u="none" strike="noStrike">
+                        <a:rPr lang="en-US" sz="1400" b="0" i="0" u="none" strike="noStrike" dirty="0">
                           <a:solidFill>
                             <a:srgbClr val="000000"/>
                           </a:solidFill>
@@ -12706,7 +12706,7 @@
                     <a:p>
                       <a:pPr algn="l" fontAlgn="b"/>
                       <a:r>
-                        <a:rPr lang="en-US" sz="1400" b="1" i="0" u="none" strike="noStrike">
+                        <a:rPr lang="en-US" sz="1400" b="1" i="0" u="none" strike="noStrike" dirty="0">
                           <a:solidFill>
                             <a:srgbClr val="000000"/>
                           </a:solidFill>
@@ -12896,7 +12896,7 @@
                     <a:p>
                       <a:pPr algn="l" fontAlgn="b"/>
                       <a:r>
-                        <a:rPr lang="en-US" sz="1400" b="0" i="0" u="none" strike="noStrike">
+                        <a:rPr lang="en-US" sz="1400" b="0" i="0" u="none" strike="noStrike" dirty="0">
                           <a:solidFill>
                             <a:srgbClr val="000000"/>
                           </a:solidFill>
@@ -13086,7 +13086,7 @@
                     <a:p>
                       <a:pPr algn="l" fontAlgn="b"/>
                       <a:r>
-                        <a:rPr lang="en-US" sz="1400" b="0" i="0" u="none" strike="noStrike">
+                        <a:rPr lang="en-US" sz="1400" b="0" i="0" u="none" strike="noStrike" dirty="0">
                           <a:solidFill>
                             <a:srgbClr val="000000"/>
                           </a:solidFill>
@@ -13276,7 +13276,7 @@
                     <a:p>
                       <a:pPr algn="l" fontAlgn="b"/>
                       <a:r>
-                        <a:rPr lang="en-US" sz="1400" b="0" i="0" u="none" strike="noStrike">
+                        <a:rPr lang="en-US" sz="1400" b="0" i="0" u="none" strike="noStrike" dirty="0">
                           <a:solidFill>
                             <a:srgbClr val="000000"/>
                           </a:solidFill>
@@ -13466,7 +13466,7 @@
                     <a:p>
                       <a:pPr algn="l" fontAlgn="b"/>
                       <a:r>
-                        <a:rPr lang="en-US" sz="1400" b="0" i="0" u="none" strike="noStrike">
+                        <a:rPr lang="en-US" sz="1400" b="0" i="0" u="none" strike="noStrike" dirty="0">
                           <a:solidFill>
                             <a:srgbClr val="000000"/>
                           </a:solidFill>
@@ -13890,9 +13890,28 @@
           </a:p>
         </p:txBody>
       </p:sp>
+      <p:sp>
+        <p:nvSpPr>
+          <p:cNvPr id="3" name="Content Placeholder 2"/>
+          <p:cNvSpPr>
+            <a:spLocks noGrp="1"/>
+          </p:cNvSpPr>
+          <p:nvPr>
+            <p:ph idx="1"/>
+          </p:nvPr>
+        </p:nvSpPr>
+        <p:spPr/>
+        <p:txBody>
+          <a:bodyPr/>
+          <a:lstStyle/>
+          <a:p>
+            <a:endParaRPr lang="en-US"/>
+          </a:p>
+        </p:txBody>
+      </p:sp>
       <p:graphicFrame>
         <p:nvGraphicFramePr>
-          <p:cNvPr id="4" name="Content Placeholder 3">
+          <p:cNvPr id="5" name="Content Placeholder 3">
             <a:extLst>
               <a:ext uri="{FF2B5EF4-FFF2-40B4-BE49-F238E27FC236}">
                 <a16:creationId xmlns:a16="http://schemas.microsoft.com/office/drawing/2014/main" id="{BF91B2AD-1601-4AF4-B2C2-58102EFCD4F1}"/>
@@ -13900,20 +13919,19 @@
             </a:extLst>
           </p:cNvPr>
           <p:cNvGraphicFramePr>
-            <a:graphicFrameLocks noGrp="1"/>
+            <a:graphicFrameLocks/>
           </p:cNvGraphicFramePr>
           <p:nvPr>
-            <p:ph idx="1"/>
             <p:extLst>
               <p:ext uri="{D42A27DB-BD31-4B8C-83A1-F6EECF244321}">
-                <p14:modId xmlns:p14="http://schemas.microsoft.com/office/powerpoint/2010/main" val="1547208365"/>
+                <p14:modId xmlns:p14="http://schemas.microsoft.com/office/powerpoint/2010/main" val="3554029366"/>
               </p:ext>
             </p:extLst>
           </p:nvPr>
         </p:nvGraphicFramePr>
         <p:xfrm>
           <a:off x="1190625" y="1967196"/>
-          <a:ext cx="9965056" cy="4449486"/>
+          <a:ext cx="9965056" cy="3765190"/>
         </p:xfrm>
         <a:graphic>
           <a:graphicData uri="http://schemas.openxmlformats.org/drawingml/2006/table">
@@ -14086,7 +14104,11 @@
                       </a:endParaRPr>
                     </a:p>
                   </a:txBody>
-                  <a:tcPr marL="27992" marR="27992" marT="0" marB="0" anchor="ctr"/>
+                  <a:tcPr marL="27992" marR="27992" marT="0" marB="0" anchor="ctr">
+                    <a:solidFill>
+                      <a:srgbClr val="66FF33"/>
+                    </a:solidFill>
+                  </a:tcPr>
                 </a:tc>
                 <a:tc>
                   <a:txBody>
@@ -14120,7 +14142,11 @@
                       </a:endParaRPr>
                     </a:p>
                   </a:txBody>
-                  <a:tcPr marL="27992" marR="27992" marT="0" marB="0" anchor="ctr"/>
+                  <a:tcPr marL="27992" marR="27992" marT="0" marB="0" anchor="ctr">
+                    <a:solidFill>
+                      <a:srgbClr val="66FF33"/>
+                    </a:solidFill>
+                  </a:tcPr>
                 </a:tc>
                 <a:tc>
                   <a:txBody>
@@ -14139,14 +14165,14 @@
                         </a:spcAft>
                       </a:pPr>
                       <a:r>
-                        <a:rPr lang="en-US" sz="1000">
+                        <a:rPr lang="en-US" sz="1000" dirty="0">
                           <a:effectLst/>
                           <a:latin typeface="Times New Roman" panose="02020603050405020304" pitchFamily="18" charset="0"/>
                           <a:cs typeface="Times New Roman" panose="02020603050405020304" pitchFamily="18" charset="0"/>
                         </a:rPr>
                         <a:t>1</a:t>
                       </a:r>
-                      <a:endParaRPr lang="en-US" sz="900">
+                      <a:endParaRPr lang="en-US" sz="900" dirty="0">
                         <a:effectLst/>
                         <a:latin typeface="Times New Roman" panose="02020603050405020304" pitchFamily="18" charset="0"/>
                         <a:ea typeface="Arial" panose="020B0604020202020204" pitchFamily="34" charset="0"/>
@@ -14154,7 +14180,11 @@
                       </a:endParaRPr>
                     </a:p>
                   </a:txBody>
-                  <a:tcPr marL="27992" marR="27992" marT="0" marB="0" anchor="ctr"/>
+                  <a:tcPr marL="27992" marR="27992" marT="0" marB="0" anchor="ctr">
+                    <a:solidFill>
+                      <a:srgbClr val="66FF33"/>
+                    </a:solidFill>
+                  </a:tcPr>
                 </a:tc>
                 <a:extLst>
                   <a:ext uri="{0D108BD9-81ED-4DB2-BD59-A6C34878D82A}">
@@ -14180,46 +14210,12 @@
                         </a:spcAft>
                       </a:pPr>
                       <a:r>
-                        <a:rPr lang="en-US" sz="1100">
+                        <a:rPr lang="en-US" sz="1100" dirty="0">
                           <a:effectLst/>
                           <a:latin typeface="Times New Roman" panose="02020603050405020304" pitchFamily="18" charset="0"/>
                           <a:cs typeface="Times New Roman" panose="02020603050405020304" pitchFamily="18" charset="0"/>
                         </a:rPr>
                         <a:t>2</a:t>
-                      </a:r>
-                      <a:endParaRPr lang="en-US" sz="900">
-                        <a:effectLst/>
-                        <a:latin typeface="Times New Roman" panose="02020603050405020304" pitchFamily="18" charset="0"/>
-                        <a:ea typeface="Arial" panose="020B0604020202020204" pitchFamily="34" charset="0"/>
-                        <a:cs typeface="Times New Roman" panose="02020603050405020304" pitchFamily="18" charset="0"/>
-                      </a:endParaRPr>
-                    </a:p>
-                  </a:txBody>
-                  <a:tcPr marL="27992" marR="27992" marT="0" marB="0" anchor="ctr"/>
-                </a:tc>
-                <a:tc>
-                  <a:txBody>
-                    <a:bodyPr/>
-                    <a:lstStyle/>
-                    <a:p>
-                      <a:pPr marL="0" marR="0">
-                        <a:lnSpc>
-                          <a:spcPct val="107000"/>
-                        </a:lnSpc>
-                        <a:spcBef>
-                          <a:spcPts val="0"/>
-                        </a:spcBef>
-                        <a:spcAft>
-                          <a:spcPts val="0"/>
-                        </a:spcAft>
-                      </a:pPr>
-                      <a:r>
-                        <a:rPr lang="en-US" sz="1050" dirty="0">
-                          <a:effectLst/>
-                          <a:latin typeface="Times New Roman" panose="02020603050405020304" pitchFamily="18" charset="0"/>
-                          <a:cs typeface="Times New Roman" panose="02020603050405020304" pitchFamily="18" charset="0"/>
-                        </a:rPr>
-                        <a:t>Là người dùng tôi muốn đăng nhập tài khoản để thực hiện các chức năng dành cho người dùng</a:t>
                       </a:r>
                       <a:endParaRPr lang="en-US" sz="900" dirty="0">
                         <a:effectLst/>
@@ -14229,13 +14225,55 @@
                       </a:endParaRPr>
                     </a:p>
                   </a:txBody>
-                  <a:tcPr marL="27992" marR="27992" marT="0" marB="0" anchor="ctr"/>
+                  <a:tcPr marL="27992" marR="27992" marT="0" marB="0" anchor="ctr">
+                    <a:solidFill>
+                      <a:srgbClr val="66FF33"/>
+                    </a:solidFill>
+                  </a:tcPr>
                 </a:tc>
                 <a:tc>
                   <a:txBody>
                     <a:bodyPr/>
                     <a:lstStyle/>
                     <a:p>
+                      <a:pPr marL="0" marR="0">
+                        <a:lnSpc>
+                          <a:spcPct val="107000"/>
+                        </a:lnSpc>
+                        <a:spcBef>
+                          <a:spcPts val="0"/>
+                        </a:spcBef>
+                        <a:spcAft>
+                          <a:spcPts val="0"/>
+                        </a:spcAft>
+                      </a:pPr>
+                      <a:r>
+                        <a:rPr lang="en-US" sz="1050" dirty="0">
+                          <a:effectLst/>
+                          <a:latin typeface="Times New Roman" panose="02020603050405020304" pitchFamily="18" charset="0"/>
+                          <a:cs typeface="Times New Roman" panose="02020603050405020304" pitchFamily="18" charset="0"/>
+                        </a:rPr>
+                        <a:t>Là người dùng tôi muốn đăng nhập tài khoản để thực hiện các chức năng dành cho người dùng</a:t>
+                      </a:r>
+                      <a:endParaRPr lang="en-US" sz="900" dirty="0">
+                        <a:effectLst/>
+                        <a:latin typeface="Times New Roman" panose="02020603050405020304" pitchFamily="18" charset="0"/>
+                        <a:ea typeface="Arial" panose="020B0604020202020204" pitchFamily="34" charset="0"/>
+                        <a:cs typeface="Times New Roman" panose="02020603050405020304" pitchFamily="18" charset="0"/>
+                      </a:endParaRPr>
+                    </a:p>
+                  </a:txBody>
+                  <a:tcPr marL="27992" marR="27992" marT="0" marB="0" anchor="ctr">
+                    <a:solidFill>
+                      <a:srgbClr val="66FF33"/>
+                    </a:solidFill>
+                  </a:tcPr>
+                </a:tc>
+                <a:tc>
+                  <a:txBody>
+                    <a:bodyPr/>
+                    <a:lstStyle/>
+                    <a:p>
                       <a:pPr marL="0" marR="0" algn="ctr">
                         <a:lnSpc>
                           <a:spcPct val="107000"/>
@@ -14248,14 +14286,14 @@
                         </a:spcAft>
                       </a:pPr>
                       <a:r>
-                        <a:rPr lang="en-US" sz="1000">
+                        <a:rPr lang="en-US" sz="1000" dirty="0">
                           <a:effectLst/>
                           <a:latin typeface="Times New Roman" panose="02020603050405020304" pitchFamily="18" charset="0"/>
                           <a:cs typeface="Times New Roman" panose="02020603050405020304" pitchFamily="18" charset="0"/>
                         </a:rPr>
                         <a:t>1</a:t>
                       </a:r>
-                      <a:endParaRPr lang="en-US" sz="900">
+                      <a:endParaRPr lang="en-US" sz="900" dirty="0">
                         <a:effectLst/>
                         <a:latin typeface="Times New Roman" panose="02020603050405020304" pitchFamily="18" charset="0"/>
                         <a:ea typeface="Arial" panose="020B0604020202020204" pitchFamily="34" charset="0"/>
@@ -14263,7 +14301,11 @@
                       </a:endParaRPr>
                     </a:p>
                   </a:txBody>
-                  <a:tcPr marL="27992" marR="27992" marT="0" marB="0" anchor="ctr"/>
+                  <a:tcPr marL="27992" marR="27992" marT="0" marB="0" anchor="ctr">
+                    <a:solidFill>
+                      <a:srgbClr val="66FF33"/>
+                    </a:solidFill>
+                  </a:tcPr>
                 </a:tc>
                 <a:extLst>
                   <a:ext uri="{0D108BD9-81ED-4DB2-BD59-A6C34878D82A}">
@@ -14304,7 +14346,11 @@
                       </a:endParaRPr>
                     </a:p>
                   </a:txBody>
-                  <a:tcPr marL="27992" marR="27992" marT="0" marB="0" anchor="ctr"/>
+                  <a:tcPr marL="27992" marR="27992" marT="0" marB="0" anchor="ctr">
+                    <a:solidFill>
+                      <a:srgbClr val="66FF33"/>
+                    </a:solidFill>
+                  </a:tcPr>
                 </a:tc>
                 <a:tc>
                   <a:txBody>
@@ -14578,7 +14624,11 @@
                       </a:endParaRPr>
                     </a:p>
                   </a:txBody>
-                  <a:tcPr marL="27992" marR="27992" marT="0" marB="0" anchor="ctr"/>
+                  <a:tcPr marL="27992" marR="27992" marT="0" marB="0" anchor="ctr">
+                    <a:solidFill>
+                      <a:srgbClr val="66FF33"/>
+                    </a:solidFill>
+                  </a:tcPr>
                 </a:tc>
                 <a:tc>
                   <a:txBody>
@@ -14597,14 +14647,14 @@
                         </a:spcAft>
                       </a:pPr>
                       <a:r>
-                        <a:rPr lang="en-US" sz="1000">
+                        <a:rPr lang="en-US" sz="1000" dirty="0">
                           <a:effectLst/>
                           <a:latin typeface="Times New Roman" panose="02020603050405020304" pitchFamily="18" charset="0"/>
                           <a:cs typeface="Times New Roman" panose="02020603050405020304" pitchFamily="18" charset="0"/>
                         </a:rPr>
                         <a:t>1</a:t>
                       </a:r>
-                      <a:endParaRPr lang="en-US" sz="900">
+                      <a:endParaRPr lang="en-US" sz="900" dirty="0">
                         <a:effectLst/>
                         <a:latin typeface="Times New Roman" panose="02020603050405020304" pitchFamily="18" charset="0"/>
                         <a:ea typeface="Arial" panose="020B0604020202020204" pitchFamily="34" charset="0"/>
@@ -14612,7 +14662,11 @@
                       </a:endParaRPr>
                     </a:p>
                   </a:txBody>
-                  <a:tcPr marL="27992" marR="27992" marT="0" marB="0" anchor="ctr"/>
+                  <a:tcPr marL="27992" marR="27992" marT="0" marB="0" anchor="ctr">
+                    <a:solidFill>
+                      <a:srgbClr val="66FF33"/>
+                    </a:solidFill>
+                  </a:tcPr>
                 </a:tc>
                 <a:extLst>
                   <a:ext uri="{0D108BD9-81ED-4DB2-BD59-A6C34878D82A}">
@@ -14638,302 +14692,12 @@
                         </a:spcAft>
                       </a:pPr>
                       <a:r>
-                        <a:rPr lang="en-US" sz="1100">
+                        <a:rPr lang="en-US" sz="1100" dirty="0">
                           <a:effectLst/>
                           <a:latin typeface="Times New Roman" panose="02020603050405020304" pitchFamily="18" charset="0"/>
                           <a:cs typeface="Times New Roman" panose="02020603050405020304" pitchFamily="18" charset="0"/>
                         </a:rPr>
                         <a:t>4</a:t>
-                      </a:r>
-                      <a:endParaRPr lang="en-US" sz="900">
-                        <a:effectLst/>
-                        <a:latin typeface="Times New Roman" panose="02020603050405020304" pitchFamily="18" charset="0"/>
-                        <a:ea typeface="Arial" panose="020B0604020202020204" pitchFamily="34" charset="0"/>
-                        <a:cs typeface="Times New Roman" panose="02020603050405020304" pitchFamily="18" charset="0"/>
-                      </a:endParaRPr>
-                    </a:p>
-                  </a:txBody>
-                  <a:tcPr marL="27992" marR="27992" marT="0" marB="0" anchor="ctr"/>
-                </a:tc>
-                <a:tc>
-                  <a:txBody>
-                    <a:bodyPr/>
-                    <a:lstStyle/>
-                    <a:p>
-                      <a:pPr marL="0" marR="0">
-                        <a:lnSpc>
-                          <a:spcPct val="107000"/>
-                        </a:lnSpc>
-                        <a:spcBef>
-                          <a:spcPts val="0"/>
-                        </a:spcBef>
-                        <a:spcAft>
-                          <a:spcPts val="0"/>
-                        </a:spcAft>
-                      </a:pPr>
-                      <a:r>
-                        <a:rPr lang="en-US" sz="1050" dirty="0" err="1">
-                          <a:effectLst/>
-                          <a:latin typeface="Times New Roman" panose="02020603050405020304" pitchFamily="18" charset="0"/>
-                          <a:cs typeface="Times New Roman" panose="02020603050405020304" pitchFamily="18" charset="0"/>
-                        </a:rPr>
-                        <a:t>Là</a:t>
-                      </a:r>
-                      <a:r>
-                        <a:rPr lang="en-US" sz="1050" dirty="0">
-                          <a:effectLst/>
-                          <a:latin typeface="Times New Roman" panose="02020603050405020304" pitchFamily="18" charset="0"/>
-                          <a:cs typeface="Times New Roman" panose="02020603050405020304" pitchFamily="18" charset="0"/>
-                        </a:rPr>
-                        <a:t> </a:t>
-                      </a:r>
-                      <a:r>
-                        <a:rPr lang="en-US" sz="1050" dirty="0" err="1">
-                          <a:effectLst/>
-                          <a:latin typeface="Times New Roman" panose="02020603050405020304" pitchFamily="18" charset="0"/>
-                          <a:cs typeface="Times New Roman" panose="02020603050405020304" pitchFamily="18" charset="0"/>
-                        </a:rPr>
-                        <a:t>người</a:t>
-                      </a:r>
-                      <a:r>
-                        <a:rPr lang="en-US" sz="1050" dirty="0">
-                          <a:effectLst/>
-                          <a:latin typeface="Times New Roman" panose="02020603050405020304" pitchFamily="18" charset="0"/>
-                          <a:cs typeface="Times New Roman" panose="02020603050405020304" pitchFamily="18" charset="0"/>
-                        </a:rPr>
-                        <a:t> </a:t>
-                      </a:r>
-                      <a:r>
-                        <a:rPr lang="en-US" sz="1050" dirty="0" err="1">
-                          <a:effectLst/>
-                          <a:latin typeface="Times New Roman" panose="02020603050405020304" pitchFamily="18" charset="0"/>
-                          <a:cs typeface="Times New Roman" panose="02020603050405020304" pitchFamily="18" charset="0"/>
-                        </a:rPr>
-                        <a:t>dùng</a:t>
-                      </a:r>
-                      <a:r>
-                        <a:rPr lang="en-US" sz="1050" dirty="0">
-                          <a:effectLst/>
-                          <a:latin typeface="Times New Roman" panose="02020603050405020304" pitchFamily="18" charset="0"/>
-                          <a:cs typeface="Times New Roman" panose="02020603050405020304" pitchFamily="18" charset="0"/>
-                        </a:rPr>
-                        <a:t> </a:t>
-                      </a:r>
-                      <a:r>
-                        <a:rPr lang="en-US" sz="1050" dirty="0" err="1">
-                          <a:effectLst/>
-                          <a:latin typeface="Times New Roman" panose="02020603050405020304" pitchFamily="18" charset="0"/>
-                          <a:cs typeface="Times New Roman" panose="02020603050405020304" pitchFamily="18" charset="0"/>
-                        </a:rPr>
-                        <a:t>tôi</a:t>
-                      </a:r>
-                      <a:r>
-                        <a:rPr lang="en-US" sz="1050" dirty="0">
-                          <a:effectLst/>
-                          <a:latin typeface="Times New Roman" panose="02020603050405020304" pitchFamily="18" charset="0"/>
-                          <a:cs typeface="Times New Roman" panose="02020603050405020304" pitchFamily="18" charset="0"/>
-                        </a:rPr>
-                        <a:t> </a:t>
-                      </a:r>
-                      <a:r>
-                        <a:rPr lang="en-US" sz="1050" dirty="0" err="1">
-                          <a:effectLst/>
-                          <a:latin typeface="Times New Roman" panose="02020603050405020304" pitchFamily="18" charset="0"/>
-                          <a:cs typeface="Times New Roman" panose="02020603050405020304" pitchFamily="18" charset="0"/>
-                        </a:rPr>
-                        <a:t>muốn</a:t>
-                      </a:r>
-                      <a:r>
-                        <a:rPr lang="en-US" sz="1050" dirty="0">
-                          <a:effectLst/>
-                          <a:latin typeface="Times New Roman" panose="02020603050405020304" pitchFamily="18" charset="0"/>
-                          <a:cs typeface="Times New Roman" panose="02020603050405020304" pitchFamily="18" charset="0"/>
-                        </a:rPr>
-                        <a:t> </a:t>
-                      </a:r>
-                      <a:r>
-                        <a:rPr lang="en-US" sz="1050" dirty="0" err="1">
-                          <a:effectLst/>
-                          <a:latin typeface="Times New Roman" panose="02020603050405020304" pitchFamily="18" charset="0"/>
-                          <a:cs typeface="Times New Roman" panose="02020603050405020304" pitchFamily="18" charset="0"/>
-                        </a:rPr>
-                        <a:t>đăng</a:t>
-                      </a:r>
-                      <a:r>
-                        <a:rPr lang="en-US" sz="1050" dirty="0">
-                          <a:effectLst/>
-                          <a:latin typeface="Times New Roman" panose="02020603050405020304" pitchFamily="18" charset="0"/>
-                          <a:cs typeface="Times New Roman" panose="02020603050405020304" pitchFamily="18" charset="0"/>
-                        </a:rPr>
-                        <a:t> </a:t>
-                      </a:r>
-                      <a:r>
-                        <a:rPr lang="en-US" sz="1050" dirty="0" err="1">
-                          <a:effectLst/>
-                          <a:latin typeface="Times New Roman" panose="02020603050405020304" pitchFamily="18" charset="0"/>
-                          <a:cs typeface="Times New Roman" panose="02020603050405020304" pitchFamily="18" charset="0"/>
-                        </a:rPr>
-                        <a:t>xuất</a:t>
-                      </a:r>
-                      <a:r>
-                        <a:rPr lang="en-US" sz="1050" dirty="0">
-                          <a:effectLst/>
-                          <a:latin typeface="Times New Roman" panose="02020603050405020304" pitchFamily="18" charset="0"/>
-                          <a:cs typeface="Times New Roman" panose="02020603050405020304" pitchFamily="18" charset="0"/>
-                        </a:rPr>
-                        <a:t> </a:t>
-                      </a:r>
-                      <a:r>
-                        <a:rPr lang="en-US" sz="1050" dirty="0" err="1">
-                          <a:effectLst/>
-                          <a:latin typeface="Times New Roman" panose="02020603050405020304" pitchFamily="18" charset="0"/>
-                          <a:cs typeface="Times New Roman" panose="02020603050405020304" pitchFamily="18" charset="0"/>
-                        </a:rPr>
-                        <a:t>tài</a:t>
-                      </a:r>
-                      <a:r>
-                        <a:rPr lang="en-US" sz="1050" dirty="0">
-                          <a:effectLst/>
-                          <a:latin typeface="Times New Roman" panose="02020603050405020304" pitchFamily="18" charset="0"/>
-                          <a:cs typeface="Times New Roman" panose="02020603050405020304" pitchFamily="18" charset="0"/>
-                        </a:rPr>
-                        <a:t> </a:t>
-                      </a:r>
-                      <a:r>
-                        <a:rPr lang="en-US" sz="1050" dirty="0" err="1">
-                          <a:effectLst/>
-                          <a:latin typeface="Times New Roman" panose="02020603050405020304" pitchFamily="18" charset="0"/>
-                          <a:cs typeface="Times New Roman" panose="02020603050405020304" pitchFamily="18" charset="0"/>
-                        </a:rPr>
-                        <a:t>khoản</a:t>
-                      </a:r>
-                      <a:r>
-                        <a:rPr lang="en-US" sz="1050" dirty="0">
-                          <a:effectLst/>
-                          <a:latin typeface="Times New Roman" panose="02020603050405020304" pitchFamily="18" charset="0"/>
-                          <a:cs typeface="Times New Roman" panose="02020603050405020304" pitchFamily="18" charset="0"/>
-                        </a:rPr>
-                        <a:t> </a:t>
-                      </a:r>
-                      <a:r>
-                        <a:rPr lang="en-US" sz="1050" dirty="0" err="1">
-                          <a:effectLst/>
-                          <a:latin typeface="Times New Roman" panose="02020603050405020304" pitchFamily="18" charset="0"/>
-                          <a:cs typeface="Times New Roman" panose="02020603050405020304" pitchFamily="18" charset="0"/>
-                        </a:rPr>
-                        <a:t>để</a:t>
-                      </a:r>
-                      <a:r>
-                        <a:rPr lang="en-US" sz="1050" dirty="0">
-                          <a:effectLst/>
-                          <a:latin typeface="Times New Roman" panose="02020603050405020304" pitchFamily="18" charset="0"/>
-                          <a:cs typeface="Times New Roman" panose="02020603050405020304" pitchFamily="18" charset="0"/>
-                        </a:rPr>
-                        <a:t> </a:t>
-                      </a:r>
-                      <a:r>
-                        <a:rPr lang="en-US" sz="1050" dirty="0" err="1">
-                          <a:effectLst/>
-                          <a:latin typeface="Times New Roman" panose="02020603050405020304" pitchFamily="18" charset="0"/>
-                          <a:cs typeface="Times New Roman" panose="02020603050405020304" pitchFamily="18" charset="0"/>
-                        </a:rPr>
-                        <a:t>không</a:t>
-                      </a:r>
-                      <a:r>
-                        <a:rPr lang="en-US" sz="1050" dirty="0">
-                          <a:effectLst/>
-                          <a:latin typeface="Times New Roman" panose="02020603050405020304" pitchFamily="18" charset="0"/>
-                          <a:cs typeface="Times New Roman" panose="02020603050405020304" pitchFamily="18" charset="0"/>
-                        </a:rPr>
-                        <a:t> ai </a:t>
-                      </a:r>
-                      <a:r>
-                        <a:rPr lang="en-US" sz="1050" dirty="0" err="1">
-                          <a:effectLst/>
-                          <a:latin typeface="Times New Roman" panose="02020603050405020304" pitchFamily="18" charset="0"/>
-                          <a:cs typeface="Times New Roman" panose="02020603050405020304" pitchFamily="18" charset="0"/>
-                        </a:rPr>
-                        <a:t>khác</a:t>
-                      </a:r>
-                      <a:r>
-                        <a:rPr lang="en-US" sz="1050" dirty="0">
-                          <a:effectLst/>
-                          <a:latin typeface="Times New Roman" panose="02020603050405020304" pitchFamily="18" charset="0"/>
-                          <a:cs typeface="Times New Roman" panose="02020603050405020304" pitchFamily="18" charset="0"/>
-                        </a:rPr>
-                        <a:t> </a:t>
-                      </a:r>
-                      <a:r>
-                        <a:rPr lang="en-US" sz="1050" dirty="0" err="1">
-                          <a:effectLst/>
-                          <a:latin typeface="Times New Roman" panose="02020603050405020304" pitchFamily="18" charset="0"/>
-                          <a:cs typeface="Times New Roman" panose="02020603050405020304" pitchFamily="18" charset="0"/>
-                        </a:rPr>
-                        <a:t>dùng</a:t>
-                      </a:r>
-                      <a:r>
-                        <a:rPr lang="en-US" sz="1050" dirty="0">
-                          <a:effectLst/>
-                          <a:latin typeface="Times New Roman" panose="02020603050405020304" pitchFamily="18" charset="0"/>
-                          <a:cs typeface="Times New Roman" panose="02020603050405020304" pitchFamily="18" charset="0"/>
-                        </a:rPr>
-                        <a:t> </a:t>
-                      </a:r>
-                      <a:r>
-                        <a:rPr lang="en-US" sz="1050" dirty="0" err="1">
-                          <a:effectLst/>
-                          <a:latin typeface="Times New Roman" panose="02020603050405020304" pitchFamily="18" charset="0"/>
-                          <a:cs typeface="Times New Roman" panose="02020603050405020304" pitchFamily="18" charset="0"/>
-                        </a:rPr>
-                        <a:t>tài</a:t>
-                      </a:r>
-                      <a:r>
-                        <a:rPr lang="en-US" sz="1050" dirty="0">
-                          <a:effectLst/>
-                          <a:latin typeface="Times New Roman" panose="02020603050405020304" pitchFamily="18" charset="0"/>
-                          <a:cs typeface="Times New Roman" panose="02020603050405020304" pitchFamily="18" charset="0"/>
-                        </a:rPr>
-                        <a:t> </a:t>
-                      </a:r>
-                      <a:r>
-                        <a:rPr lang="en-US" sz="1050" dirty="0" err="1">
-                          <a:effectLst/>
-                          <a:latin typeface="Times New Roman" panose="02020603050405020304" pitchFamily="18" charset="0"/>
-                          <a:cs typeface="Times New Roman" panose="02020603050405020304" pitchFamily="18" charset="0"/>
-                        </a:rPr>
-                        <a:t>khoản</a:t>
-                      </a:r>
-                      <a:r>
-                        <a:rPr lang="en-US" sz="1050" dirty="0">
-                          <a:effectLst/>
-                          <a:latin typeface="Times New Roman" panose="02020603050405020304" pitchFamily="18" charset="0"/>
-                          <a:cs typeface="Times New Roman" panose="02020603050405020304" pitchFamily="18" charset="0"/>
-                        </a:rPr>
-                        <a:t> </a:t>
-                      </a:r>
-                      <a:r>
-                        <a:rPr lang="en-US" sz="1050" dirty="0" err="1">
-                          <a:effectLst/>
-                          <a:latin typeface="Times New Roman" panose="02020603050405020304" pitchFamily="18" charset="0"/>
-                          <a:cs typeface="Times New Roman" panose="02020603050405020304" pitchFamily="18" charset="0"/>
-                        </a:rPr>
-                        <a:t>của</a:t>
-                      </a:r>
-                      <a:r>
-                        <a:rPr lang="en-US" sz="1050" dirty="0">
-                          <a:effectLst/>
-                          <a:latin typeface="Times New Roman" panose="02020603050405020304" pitchFamily="18" charset="0"/>
-                          <a:cs typeface="Times New Roman" panose="02020603050405020304" pitchFamily="18" charset="0"/>
-                        </a:rPr>
-                        <a:t> </a:t>
-                      </a:r>
-                      <a:r>
-                        <a:rPr lang="en-US" sz="1050" dirty="0" err="1">
-                          <a:effectLst/>
-                          <a:latin typeface="Times New Roman" panose="02020603050405020304" pitchFamily="18" charset="0"/>
-                          <a:cs typeface="Times New Roman" panose="02020603050405020304" pitchFamily="18" charset="0"/>
-                        </a:rPr>
-                        <a:t>tôi</a:t>
                       </a:r>
                       <a:endParaRPr lang="en-US" sz="900" dirty="0">
                         <a:effectLst/>
@@ -14943,13 +14707,311 @@
                       </a:endParaRPr>
                     </a:p>
                   </a:txBody>
-                  <a:tcPr marL="27992" marR="27992" marT="0" marB="0" anchor="ctr"/>
+                  <a:tcPr marL="27992" marR="27992" marT="0" marB="0" anchor="ctr">
+                    <a:solidFill>
+                      <a:srgbClr val="66FF33"/>
+                    </a:solidFill>
+                  </a:tcPr>
                 </a:tc>
                 <a:tc>
                   <a:txBody>
                     <a:bodyPr/>
                     <a:lstStyle/>
                     <a:p>
+                      <a:pPr marL="0" marR="0">
+                        <a:lnSpc>
+                          <a:spcPct val="107000"/>
+                        </a:lnSpc>
+                        <a:spcBef>
+                          <a:spcPts val="0"/>
+                        </a:spcBef>
+                        <a:spcAft>
+                          <a:spcPts val="0"/>
+                        </a:spcAft>
+                      </a:pPr>
+                      <a:r>
+                        <a:rPr lang="en-US" sz="1050" dirty="0" err="1">
+                          <a:effectLst/>
+                          <a:latin typeface="Times New Roman" panose="02020603050405020304" pitchFamily="18" charset="0"/>
+                          <a:cs typeface="Times New Roman" panose="02020603050405020304" pitchFamily="18" charset="0"/>
+                        </a:rPr>
+                        <a:t>Là</a:t>
+                      </a:r>
+                      <a:r>
+                        <a:rPr lang="en-US" sz="1050" dirty="0">
+                          <a:effectLst/>
+                          <a:latin typeface="Times New Roman" panose="02020603050405020304" pitchFamily="18" charset="0"/>
+                          <a:cs typeface="Times New Roman" panose="02020603050405020304" pitchFamily="18" charset="0"/>
+                        </a:rPr>
+                        <a:t> </a:t>
+                      </a:r>
+                      <a:r>
+                        <a:rPr lang="en-US" sz="1050" dirty="0" err="1">
+                          <a:effectLst/>
+                          <a:latin typeface="Times New Roman" panose="02020603050405020304" pitchFamily="18" charset="0"/>
+                          <a:cs typeface="Times New Roman" panose="02020603050405020304" pitchFamily="18" charset="0"/>
+                        </a:rPr>
+                        <a:t>người</a:t>
+                      </a:r>
+                      <a:r>
+                        <a:rPr lang="en-US" sz="1050" dirty="0">
+                          <a:effectLst/>
+                          <a:latin typeface="Times New Roman" panose="02020603050405020304" pitchFamily="18" charset="0"/>
+                          <a:cs typeface="Times New Roman" panose="02020603050405020304" pitchFamily="18" charset="0"/>
+                        </a:rPr>
+                        <a:t> </a:t>
+                      </a:r>
+                      <a:r>
+                        <a:rPr lang="en-US" sz="1050" dirty="0" err="1">
+                          <a:effectLst/>
+                          <a:latin typeface="Times New Roman" panose="02020603050405020304" pitchFamily="18" charset="0"/>
+                          <a:cs typeface="Times New Roman" panose="02020603050405020304" pitchFamily="18" charset="0"/>
+                        </a:rPr>
+                        <a:t>dùng</a:t>
+                      </a:r>
+                      <a:r>
+                        <a:rPr lang="en-US" sz="1050" dirty="0">
+                          <a:effectLst/>
+                          <a:latin typeface="Times New Roman" panose="02020603050405020304" pitchFamily="18" charset="0"/>
+                          <a:cs typeface="Times New Roman" panose="02020603050405020304" pitchFamily="18" charset="0"/>
+                        </a:rPr>
+                        <a:t> </a:t>
+                      </a:r>
+                      <a:r>
+                        <a:rPr lang="en-US" sz="1050" dirty="0" err="1">
+                          <a:effectLst/>
+                          <a:latin typeface="Times New Roman" panose="02020603050405020304" pitchFamily="18" charset="0"/>
+                          <a:cs typeface="Times New Roman" panose="02020603050405020304" pitchFamily="18" charset="0"/>
+                        </a:rPr>
+                        <a:t>tôi</a:t>
+                      </a:r>
+                      <a:r>
+                        <a:rPr lang="en-US" sz="1050" dirty="0">
+                          <a:effectLst/>
+                          <a:latin typeface="Times New Roman" panose="02020603050405020304" pitchFamily="18" charset="0"/>
+                          <a:cs typeface="Times New Roman" panose="02020603050405020304" pitchFamily="18" charset="0"/>
+                        </a:rPr>
+                        <a:t> </a:t>
+                      </a:r>
+                      <a:r>
+                        <a:rPr lang="en-US" sz="1050" dirty="0" err="1">
+                          <a:effectLst/>
+                          <a:latin typeface="Times New Roman" panose="02020603050405020304" pitchFamily="18" charset="0"/>
+                          <a:cs typeface="Times New Roman" panose="02020603050405020304" pitchFamily="18" charset="0"/>
+                        </a:rPr>
+                        <a:t>muốn</a:t>
+                      </a:r>
+                      <a:r>
+                        <a:rPr lang="en-US" sz="1050" dirty="0">
+                          <a:effectLst/>
+                          <a:latin typeface="Times New Roman" panose="02020603050405020304" pitchFamily="18" charset="0"/>
+                          <a:cs typeface="Times New Roman" panose="02020603050405020304" pitchFamily="18" charset="0"/>
+                        </a:rPr>
+                        <a:t> </a:t>
+                      </a:r>
+                      <a:r>
+                        <a:rPr lang="en-US" sz="1050" dirty="0" err="1">
+                          <a:effectLst/>
+                          <a:latin typeface="Times New Roman" panose="02020603050405020304" pitchFamily="18" charset="0"/>
+                          <a:cs typeface="Times New Roman" panose="02020603050405020304" pitchFamily="18" charset="0"/>
+                        </a:rPr>
+                        <a:t>đăng</a:t>
+                      </a:r>
+                      <a:r>
+                        <a:rPr lang="en-US" sz="1050" dirty="0">
+                          <a:effectLst/>
+                          <a:latin typeface="Times New Roman" panose="02020603050405020304" pitchFamily="18" charset="0"/>
+                          <a:cs typeface="Times New Roman" panose="02020603050405020304" pitchFamily="18" charset="0"/>
+                        </a:rPr>
+                        <a:t> </a:t>
+                      </a:r>
+                      <a:r>
+                        <a:rPr lang="en-US" sz="1050" dirty="0" err="1">
+                          <a:effectLst/>
+                          <a:latin typeface="Times New Roman" panose="02020603050405020304" pitchFamily="18" charset="0"/>
+                          <a:cs typeface="Times New Roman" panose="02020603050405020304" pitchFamily="18" charset="0"/>
+                        </a:rPr>
+                        <a:t>xuất</a:t>
+                      </a:r>
+                      <a:r>
+                        <a:rPr lang="en-US" sz="1050" dirty="0">
+                          <a:effectLst/>
+                          <a:latin typeface="Times New Roman" panose="02020603050405020304" pitchFamily="18" charset="0"/>
+                          <a:cs typeface="Times New Roman" panose="02020603050405020304" pitchFamily="18" charset="0"/>
+                        </a:rPr>
+                        <a:t> </a:t>
+                      </a:r>
+                      <a:r>
+                        <a:rPr lang="en-US" sz="1050" dirty="0" err="1">
+                          <a:effectLst/>
+                          <a:latin typeface="Times New Roman" panose="02020603050405020304" pitchFamily="18" charset="0"/>
+                          <a:cs typeface="Times New Roman" panose="02020603050405020304" pitchFamily="18" charset="0"/>
+                        </a:rPr>
+                        <a:t>tài</a:t>
+                      </a:r>
+                      <a:r>
+                        <a:rPr lang="en-US" sz="1050" dirty="0">
+                          <a:effectLst/>
+                          <a:latin typeface="Times New Roman" panose="02020603050405020304" pitchFamily="18" charset="0"/>
+                          <a:cs typeface="Times New Roman" panose="02020603050405020304" pitchFamily="18" charset="0"/>
+                        </a:rPr>
+                        <a:t> </a:t>
+                      </a:r>
+                      <a:r>
+                        <a:rPr lang="en-US" sz="1050" dirty="0" err="1">
+                          <a:effectLst/>
+                          <a:latin typeface="Times New Roman" panose="02020603050405020304" pitchFamily="18" charset="0"/>
+                          <a:cs typeface="Times New Roman" panose="02020603050405020304" pitchFamily="18" charset="0"/>
+                        </a:rPr>
+                        <a:t>khoản</a:t>
+                      </a:r>
+                      <a:r>
+                        <a:rPr lang="en-US" sz="1050" dirty="0">
+                          <a:effectLst/>
+                          <a:latin typeface="Times New Roman" panose="02020603050405020304" pitchFamily="18" charset="0"/>
+                          <a:cs typeface="Times New Roman" panose="02020603050405020304" pitchFamily="18" charset="0"/>
+                        </a:rPr>
+                        <a:t> </a:t>
+                      </a:r>
+                      <a:r>
+                        <a:rPr lang="en-US" sz="1050" dirty="0" err="1">
+                          <a:effectLst/>
+                          <a:latin typeface="Times New Roman" panose="02020603050405020304" pitchFamily="18" charset="0"/>
+                          <a:cs typeface="Times New Roman" panose="02020603050405020304" pitchFamily="18" charset="0"/>
+                        </a:rPr>
+                        <a:t>để</a:t>
+                      </a:r>
+                      <a:r>
+                        <a:rPr lang="en-US" sz="1050" dirty="0">
+                          <a:effectLst/>
+                          <a:latin typeface="Times New Roman" panose="02020603050405020304" pitchFamily="18" charset="0"/>
+                          <a:cs typeface="Times New Roman" panose="02020603050405020304" pitchFamily="18" charset="0"/>
+                        </a:rPr>
+                        <a:t> </a:t>
+                      </a:r>
+                      <a:r>
+                        <a:rPr lang="en-US" sz="1050" dirty="0" err="1">
+                          <a:effectLst/>
+                          <a:latin typeface="Times New Roman" panose="02020603050405020304" pitchFamily="18" charset="0"/>
+                          <a:cs typeface="Times New Roman" panose="02020603050405020304" pitchFamily="18" charset="0"/>
+                        </a:rPr>
+                        <a:t>không</a:t>
+                      </a:r>
+                      <a:r>
+                        <a:rPr lang="en-US" sz="1050" dirty="0">
+                          <a:effectLst/>
+                          <a:latin typeface="Times New Roman" panose="02020603050405020304" pitchFamily="18" charset="0"/>
+                          <a:cs typeface="Times New Roman" panose="02020603050405020304" pitchFamily="18" charset="0"/>
+                        </a:rPr>
+                        <a:t> ai </a:t>
+                      </a:r>
+                      <a:r>
+                        <a:rPr lang="en-US" sz="1050" dirty="0" err="1">
+                          <a:effectLst/>
+                          <a:latin typeface="Times New Roman" panose="02020603050405020304" pitchFamily="18" charset="0"/>
+                          <a:cs typeface="Times New Roman" panose="02020603050405020304" pitchFamily="18" charset="0"/>
+                        </a:rPr>
+                        <a:t>khác</a:t>
+                      </a:r>
+                      <a:r>
+                        <a:rPr lang="en-US" sz="1050" dirty="0">
+                          <a:effectLst/>
+                          <a:latin typeface="Times New Roman" panose="02020603050405020304" pitchFamily="18" charset="0"/>
+                          <a:cs typeface="Times New Roman" panose="02020603050405020304" pitchFamily="18" charset="0"/>
+                        </a:rPr>
+                        <a:t> </a:t>
+                      </a:r>
+                      <a:r>
+                        <a:rPr lang="en-US" sz="1050" dirty="0" err="1">
+                          <a:effectLst/>
+                          <a:latin typeface="Times New Roman" panose="02020603050405020304" pitchFamily="18" charset="0"/>
+                          <a:cs typeface="Times New Roman" panose="02020603050405020304" pitchFamily="18" charset="0"/>
+                        </a:rPr>
+                        <a:t>dùng</a:t>
+                      </a:r>
+                      <a:r>
+                        <a:rPr lang="en-US" sz="1050" dirty="0">
+                          <a:effectLst/>
+                          <a:latin typeface="Times New Roman" panose="02020603050405020304" pitchFamily="18" charset="0"/>
+                          <a:cs typeface="Times New Roman" panose="02020603050405020304" pitchFamily="18" charset="0"/>
+                        </a:rPr>
+                        <a:t> </a:t>
+                      </a:r>
+                      <a:r>
+                        <a:rPr lang="en-US" sz="1050" dirty="0" err="1">
+                          <a:effectLst/>
+                          <a:latin typeface="Times New Roman" panose="02020603050405020304" pitchFamily="18" charset="0"/>
+                          <a:cs typeface="Times New Roman" panose="02020603050405020304" pitchFamily="18" charset="0"/>
+                        </a:rPr>
+                        <a:t>tài</a:t>
+                      </a:r>
+                      <a:r>
+                        <a:rPr lang="en-US" sz="1050" dirty="0">
+                          <a:effectLst/>
+                          <a:latin typeface="Times New Roman" panose="02020603050405020304" pitchFamily="18" charset="0"/>
+                          <a:cs typeface="Times New Roman" panose="02020603050405020304" pitchFamily="18" charset="0"/>
+                        </a:rPr>
+                        <a:t> </a:t>
+                      </a:r>
+                      <a:r>
+                        <a:rPr lang="en-US" sz="1050" dirty="0" err="1">
+                          <a:effectLst/>
+                          <a:latin typeface="Times New Roman" panose="02020603050405020304" pitchFamily="18" charset="0"/>
+                          <a:cs typeface="Times New Roman" panose="02020603050405020304" pitchFamily="18" charset="0"/>
+                        </a:rPr>
+                        <a:t>khoản</a:t>
+                      </a:r>
+                      <a:r>
+                        <a:rPr lang="en-US" sz="1050" dirty="0">
+                          <a:effectLst/>
+                          <a:latin typeface="Times New Roman" panose="02020603050405020304" pitchFamily="18" charset="0"/>
+                          <a:cs typeface="Times New Roman" panose="02020603050405020304" pitchFamily="18" charset="0"/>
+                        </a:rPr>
+                        <a:t> </a:t>
+                      </a:r>
+                      <a:r>
+                        <a:rPr lang="en-US" sz="1050" dirty="0" err="1">
+                          <a:effectLst/>
+                          <a:latin typeface="Times New Roman" panose="02020603050405020304" pitchFamily="18" charset="0"/>
+                          <a:cs typeface="Times New Roman" panose="02020603050405020304" pitchFamily="18" charset="0"/>
+                        </a:rPr>
+                        <a:t>của</a:t>
+                      </a:r>
+                      <a:r>
+                        <a:rPr lang="en-US" sz="1050" dirty="0">
+                          <a:effectLst/>
+                          <a:latin typeface="Times New Roman" panose="02020603050405020304" pitchFamily="18" charset="0"/>
+                          <a:cs typeface="Times New Roman" panose="02020603050405020304" pitchFamily="18" charset="0"/>
+                        </a:rPr>
+                        <a:t> </a:t>
+                      </a:r>
+                      <a:r>
+                        <a:rPr lang="en-US" sz="1050" dirty="0" err="1">
+                          <a:effectLst/>
+                          <a:latin typeface="Times New Roman" panose="02020603050405020304" pitchFamily="18" charset="0"/>
+                          <a:cs typeface="Times New Roman" panose="02020603050405020304" pitchFamily="18" charset="0"/>
+                        </a:rPr>
+                        <a:t>tôi</a:t>
+                      </a:r>
+                      <a:endParaRPr lang="en-US" sz="900" dirty="0">
+                        <a:effectLst/>
+                        <a:latin typeface="Times New Roman" panose="02020603050405020304" pitchFamily="18" charset="0"/>
+                        <a:ea typeface="Arial" panose="020B0604020202020204" pitchFamily="34" charset="0"/>
+                        <a:cs typeface="Times New Roman" panose="02020603050405020304" pitchFamily="18" charset="0"/>
+                      </a:endParaRPr>
+                    </a:p>
+                  </a:txBody>
+                  <a:tcPr marL="27992" marR="27992" marT="0" marB="0" anchor="ctr">
+                    <a:solidFill>
+                      <a:srgbClr val="66FF33"/>
+                    </a:solidFill>
+                  </a:tcPr>
+                </a:tc>
+                <a:tc>
+                  <a:txBody>
+                    <a:bodyPr/>
+                    <a:lstStyle/>
+                    <a:p>
                       <a:pPr marL="0" marR="0" algn="ctr">
                         <a:lnSpc>
                           <a:spcPct val="107000"/>
@@ -14962,14 +15024,14 @@
                         </a:spcAft>
                       </a:pPr>
                       <a:r>
-                        <a:rPr lang="en-US" sz="1000">
+                        <a:rPr lang="en-US" sz="1000" dirty="0">
                           <a:effectLst/>
                           <a:latin typeface="Times New Roman" panose="02020603050405020304" pitchFamily="18" charset="0"/>
                           <a:cs typeface="Times New Roman" panose="02020603050405020304" pitchFamily="18" charset="0"/>
                         </a:rPr>
                         <a:t>1</a:t>
                       </a:r>
-                      <a:endParaRPr lang="en-US" sz="900">
+                      <a:endParaRPr lang="en-US" sz="900" dirty="0">
                         <a:effectLst/>
                         <a:latin typeface="Times New Roman" panose="02020603050405020304" pitchFamily="18" charset="0"/>
                         <a:ea typeface="Arial" panose="020B0604020202020204" pitchFamily="34" charset="0"/>
@@ -14977,7 +15039,11 @@
                       </a:endParaRPr>
                     </a:p>
                   </a:txBody>
-                  <a:tcPr marL="27992" marR="27992" marT="0" marB="0" anchor="ctr"/>
+                  <a:tcPr marL="27992" marR="27992" marT="0" marB="0" anchor="ctr">
+                    <a:solidFill>
+                      <a:srgbClr val="66FF33"/>
+                    </a:solidFill>
+                  </a:tcPr>
                 </a:tc>
                 <a:extLst>
                   <a:ext uri="{0D108BD9-81ED-4DB2-BD59-A6C34878D82A}">
@@ -15018,7 +15084,11 @@
                       </a:endParaRPr>
                     </a:p>
                   </a:txBody>
-                  <a:tcPr marL="27992" marR="27992" marT="0" marB="0" anchor="ctr"/>
+                  <a:tcPr marL="27992" marR="27992" marT="0" marB="0" anchor="ctr">
+                    <a:solidFill>
+                      <a:srgbClr val="66FF33"/>
+                    </a:solidFill>
+                  </a:tcPr>
                 </a:tc>
                 <a:tc>
                   <a:txBody>
@@ -15052,7 +15122,11 @@
                       </a:endParaRPr>
                     </a:p>
                   </a:txBody>
-                  <a:tcPr marL="27992" marR="27992" marT="0" marB="0" anchor="ctr"/>
+                  <a:tcPr marL="27992" marR="27992" marT="0" marB="0" anchor="ctr">
+                    <a:solidFill>
+                      <a:srgbClr val="66FF33"/>
+                    </a:solidFill>
+                  </a:tcPr>
                 </a:tc>
                 <a:tc>
                   <a:txBody>
@@ -15071,14 +15145,14 @@
                         </a:spcAft>
                       </a:pPr>
                       <a:r>
-                        <a:rPr lang="en-US" sz="1000">
+                        <a:rPr lang="en-US" sz="1000" dirty="0">
                           <a:effectLst/>
                           <a:latin typeface="Times New Roman" panose="02020603050405020304" pitchFamily="18" charset="0"/>
                           <a:cs typeface="Times New Roman" panose="02020603050405020304" pitchFamily="18" charset="0"/>
                         </a:rPr>
                         <a:t>3</a:t>
                       </a:r>
-                      <a:endParaRPr lang="en-US" sz="900">
+                      <a:endParaRPr lang="en-US" sz="900" dirty="0">
                         <a:effectLst/>
                         <a:latin typeface="Times New Roman" panose="02020603050405020304" pitchFamily="18" charset="0"/>
                         <a:ea typeface="Arial" panose="020B0604020202020204" pitchFamily="34" charset="0"/>
@@ -15086,7 +15160,11 @@
                       </a:endParaRPr>
                     </a:p>
                   </a:txBody>
-                  <a:tcPr marL="27992" marR="27992" marT="0" marB="0" anchor="ctr"/>
+                  <a:tcPr marL="27992" marR="27992" marT="0" marB="0" anchor="ctr">
+                    <a:solidFill>
+                      <a:srgbClr val="66FF33"/>
+                    </a:solidFill>
+                  </a:tcPr>
                 </a:tc>
                 <a:extLst>
                   <a:ext uri="{0D108BD9-81ED-4DB2-BD59-A6C34878D82A}">
@@ -15112,14 +15190,15 @@
                         </a:spcAft>
                       </a:pPr>
                       <a:r>
-                        <a:rPr lang="en-US" sz="1100">
-                          <a:effectLst/>
-                          <a:latin typeface="Times New Roman" panose="02020603050405020304" pitchFamily="18" charset="0"/>
+                        <a:rPr lang="en-US" sz="1100" dirty="0">
+                          <a:effectLst/>
+                          <a:latin typeface="Times New Roman" panose="02020603050405020304" pitchFamily="18" charset="0"/>
+                          <a:ea typeface="+mn-ea"/>
                           <a:cs typeface="Times New Roman" panose="02020603050405020304" pitchFamily="18" charset="0"/>
                         </a:rPr>
                         <a:t>6</a:t>
                       </a:r>
-                      <a:endParaRPr lang="en-US" sz="900">
+                      <a:endParaRPr lang="en-US" sz="900" dirty="0">
                         <a:effectLst/>
                         <a:latin typeface="Times New Roman" panose="02020603050405020304" pitchFamily="18" charset="0"/>
                         <a:ea typeface="Arial" panose="020B0604020202020204" pitchFamily="34" charset="0"/>
@@ -15151,7 +15230,7 @@
                           <a:latin typeface="Times New Roman" panose="02020603050405020304" pitchFamily="18" charset="0"/>
                           <a:cs typeface="Times New Roman" panose="02020603050405020304" pitchFamily="18" charset="0"/>
                         </a:rPr>
-                        <a:t>Là người dùng tôi muốn chấm điểm tự động để biết kết quả bài tập khi tôi làm xong</a:t>
+                        <a:t>Là người dùng tôi muốn thấy xếp hạng của mình để tạo tính cạnh tranh với bạn bè</a:t>
                       </a:r>
                       <a:endParaRPr lang="en-US" sz="900" dirty="0">
                         <a:effectLst/>
@@ -15180,123 +15259,14 @@
                         </a:spcAft>
                       </a:pPr>
                       <a:r>
-                        <a:rPr lang="en-US" sz="1000">
+                        <a:rPr lang="en-US" sz="1000" dirty="0">
                           <a:effectLst/>
                           <a:latin typeface="Times New Roman" panose="02020603050405020304" pitchFamily="18" charset="0"/>
                           <a:cs typeface="Times New Roman" panose="02020603050405020304" pitchFamily="18" charset="0"/>
                         </a:rPr>
                         <a:t>3</a:t>
                       </a:r>
-                      <a:endParaRPr lang="en-US" sz="900">
-                        <a:effectLst/>
-                        <a:latin typeface="Times New Roman" panose="02020603050405020304" pitchFamily="18" charset="0"/>
-                        <a:ea typeface="Arial" panose="020B0604020202020204" pitchFamily="34" charset="0"/>
-                        <a:cs typeface="Times New Roman" panose="02020603050405020304" pitchFamily="18" charset="0"/>
-                      </a:endParaRPr>
-                    </a:p>
-                  </a:txBody>
-                  <a:tcPr marL="27992" marR="27992" marT="0" marB="0" anchor="ctr"/>
-                </a:tc>
-                <a:extLst>
-                  <a:ext uri="{0D108BD9-81ED-4DB2-BD59-A6C34878D82A}">
-                    <a16:rowId xmlns:a16="http://schemas.microsoft.com/office/drawing/2014/main" val="88282820"/>
-                  </a:ext>
-                </a:extLst>
-              </a:tr>
-              <a:tr h="177227">
-                <a:tc>
-                  <a:txBody>
-                    <a:bodyPr/>
-                    <a:lstStyle/>
-                    <a:p>
-                      <a:pPr marL="0" marR="0" algn="ctr">
-                        <a:lnSpc>
-                          <a:spcPct val="107000"/>
-                        </a:lnSpc>
-                        <a:spcBef>
-                          <a:spcPts val="0"/>
-                        </a:spcBef>
-                        <a:spcAft>
-                          <a:spcPts val="0"/>
-                        </a:spcAft>
-                      </a:pPr>
-                      <a:r>
-                        <a:rPr lang="en-US" sz="1100">
-                          <a:effectLst/>
-                          <a:latin typeface="Times New Roman" panose="02020603050405020304" pitchFamily="18" charset="0"/>
-                          <a:cs typeface="Times New Roman" panose="02020603050405020304" pitchFamily="18" charset="0"/>
-                        </a:rPr>
-                        <a:t>7</a:t>
-                      </a:r>
-                      <a:endParaRPr lang="en-US" sz="900">
-                        <a:effectLst/>
-                        <a:latin typeface="Times New Roman" panose="02020603050405020304" pitchFamily="18" charset="0"/>
-                        <a:ea typeface="Arial" panose="020B0604020202020204" pitchFamily="34" charset="0"/>
-                        <a:cs typeface="Times New Roman" panose="02020603050405020304" pitchFamily="18" charset="0"/>
-                      </a:endParaRPr>
-                    </a:p>
-                  </a:txBody>
-                  <a:tcPr marL="27992" marR="27992" marT="0" marB="0" anchor="ctr"/>
-                </a:tc>
-                <a:tc>
-                  <a:txBody>
-                    <a:bodyPr/>
-                    <a:lstStyle/>
-                    <a:p>
-                      <a:pPr marL="0" marR="0">
-                        <a:lnSpc>
-                          <a:spcPct val="107000"/>
-                        </a:lnSpc>
-                        <a:spcBef>
-                          <a:spcPts val="0"/>
-                        </a:spcBef>
-                        <a:spcAft>
-                          <a:spcPts val="0"/>
-                        </a:spcAft>
-                      </a:pPr>
-                      <a:r>
-                        <a:rPr lang="en-US" sz="1050" dirty="0">
-                          <a:effectLst/>
-                          <a:latin typeface="Times New Roman" panose="02020603050405020304" pitchFamily="18" charset="0"/>
-                          <a:cs typeface="Times New Roman" panose="02020603050405020304" pitchFamily="18" charset="0"/>
-                        </a:rPr>
-                        <a:t>Là người dùng tôi muốn thấy xếp hạng của mình để tạo tính cạnh tranh với bạn bè</a:t>
-                      </a:r>
                       <a:endParaRPr lang="en-US" sz="900" dirty="0">
-                        <a:effectLst/>
-                        <a:latin typeface="Times New Roman" panose="02020603050405020304" pitchFamily="18" charset="0"/>
-                        <a:ea typeface="Arial" panose="020B0604020202020204" pitchFamily="34" charset="0"/>
-                        <a:cs typeface="Times New Roman" panose="02020603050405020304" pitchFamily="18" charset="0"/>
-                      </a:endParaRPr>
-                    </a:p>
-                  </a:txBody>
-                  <a:tcPr marL="27992" marR="27992" marT="0" marB="0" anchor="ctr"/>
-                </a:tc>
-                <a:tc>
-                  <a:txBody>
-                    <a:bodyPr/>
-                    <a:lstStyle/>
-                    <a:p>
-                      <a:pPr marL="0" marR="0" algn="ctr">
-                        <a:lnSpc>
-                          <a:spcPct val="107000"/>
-                        </a:lnSpc>
-                        <a:spcBef>
-                          <a:spcPts val="0"/>
-                        </a:spcBef>
-                        <a:spcAft>
-                          <a:spcPts val="0"/>
-                        </a:spcAft>
-                      </a:pPr>
-                      <a:r>
-                        <a:rPr lang="en-US" sz="1000">
-                          <a:effectLst/>
-                          <a:latin typeface="Times New Roman" panose="02020603050405020304" pitchFamily="18" charset="0"/>
-                          <a:cs typeface="Times New Roman" panose="02020603050405020304" pitchFamily="18" charset="0"/>
-                        </a:rPr>
-                        <a:t>3</a:t>
-                      </a:r>
-                      <a:endParaRPr lang="en-US" sz="900">
                         <a:effectLst/>
                         <a:latin typeface="Times New Roman" panose="02020603050405020304" pitchFamily="18" charset="0"/>
                         <a:ea typeface="Arial" panose="020B0604020202020204" pitchFamily="34" charset="0"/>
@@ -15330,14 +15300,15 @@
                         </a:spcAft>
                       </a:pPr>
                       <a:r>
-                        <a:rPr lang="en-US" sz="1100">
-                          <a:effectLst/>
-                          <a:latin typeface="Times New Roman" panose="02020603050405020304" pitchFamily="18" charset="0"/>
-                          <a:cs typeface="Times New Roman" panose="02020603050405020304" pitchFamily="18" charset="0"/>
-                        </a:rPr>
-                        <a:t>8</a:t>
-                      </a:r>
-                      <a:endParaRPr lang="en-US" sz="900">
+                        <a:rPr lang="en-US" sz="1100" dirty="0">
+                          <a:effectLst/>
+                          <a:latin typeface="Times New Roman" panose="02020603050405020304" pitchFamily="18" charset="0"/>
+                          <a:ea typeface="+mn-ea"/>
+                          <a:cs typeface="Times New Roman" panose="02020603050405020304" pitchFamily="18" charset="0"/>
+                        </a:rPr>
+                        <a:t>7</a:t>
+                      </a:r>
+                      <a:endParaRPr lang="en-US" sz="900" dirty="0">
                         <a:effectLst/>
                         <a:latin typeface="Times New Roman" panose="02020603050405020304" pitchFamily="18" charset="0"/>
                         <a:ea typeface="Arial" panose="020B0604020202020204" pitchFamily="34" charset="0"/>
@@ -15398,14 +15369,14 @@
                         </a:spcAft>
                       </a:pPr>
                       <a:r>
-                        <a:rPr lang="en-US" sz="1000">
+                        <a:rPr lang="en-US" sz="1000" dirty="0">
                           <a:effectLst/>
                           <a:latin typeface="Times New Roman" panose="02020603050405020304" pitchFamily="18" charset="0"/>
                           <a:cs typeface="Times New Roman" panose="02020603050405020304" pitchFamily="18" charset="0"/>
                         </a:rPr>
                         <a:t>3</a:t>
                       </a:r>
-                      <a:endParaRPr lang="en-US" sz="900">
+                      <a:endParaRPr lang="en-US" sz="900" dirty="0">
                         <a:effectLst/>
                         <a:latin typeface="Times New Roman" panose="02020603050405020304" pitchFamily="18" charset="0"/>
                         <a:ea typeface="Arial" panose="020B0604020202020204" pitchFamily="34" charset="0"/>
@@ -15439,14 +15410,15 @@
                         </a:spcAft>
                       </a:pPr>
                       <a:r>
-                        <a:rPr lang="en-US" sz="1100">
-                          <a:effectLst/>
-                          <a:latin typeface="Times New Roman" panose="02020603050405020304" pitchFamily="18" charset="0"/>
-                          <a:cs typeface="Times New Roman" panose="02020603050405020304" pitchFamily="18" charset="0"/>
-                        </a:rPr>
-                        <a:t>9</a:t>
-                      </a:r>
-                      <a:endParaRPr lang="en-US" sz="900">
+                        <a:rPr lang="en-US" sz="1100" dirty="0">
+                          <a:effectLst/>
+                          <a:latin typeface="Times New Roman" panose="02020603050405020304" pitchFamily="18" charset="0"/>
+                          <a:ea typeface="+mn-ea"/>
+                          <a:cs typeface="Times New Roman" panose="02020603050405020304" pitchFamily="18" charset="0"/>
+                        </a:rPr>
+                        <a:t>8</a:t>
+                      </a:r>
+                      <a:endParaRPr lang="en-US" sz="900" dirty="0">
                         <a:effectLst/>
                         <a:latin typeface="Times New Roman" panose="02020603050405020304" pitchFamily="18" charset="0"/>
                         <a:ea typeface="Arial" panose="020B0604020202020204" pitchFamily="34" charset="0"/>
@@ -15811,14 +15783,14 @@
                         </a:spcAft>
                       </a:pPr>
                       <a:r>
-                        <a:rPr lang="en-US" sz="1000">
+                        <a:rPr lang="en-US" sz="1000" dirty="0">
                           <a:effectLst/>
                           <a:latin typeface="Times New Roman" panose="02020603050405020304" pitchFamily="18" charset="0"/>
                           <a:cs typeface="Times New Roman" panose="02020603050405020304" pitchFamily="18" charset="0"/>
                         </a:rPr>
                         <a:t>5</a:t>
                       </a:r>
-                      <a:endParaRPr lang="en-US" sz="900">
+                      <a:endParaRPr lang="en-US" sz="900" dirty="0">
                         <a:effectLst/>
                         <a:latin typeface="Times New Roman" panose="02020603050405020304" pitchFamily="18" charset="0"/>
                         <a:ea typeface="Arial" panose="020B0604020202020204" pitchFamily="34" charset="0"/>
@@ -15852,350 +15824,13 @@
                         </a:spcAft>
                       </a:pPr>
                       <a:r>
-                        <a:rPr lang="en-US" sz="1100">
-                          <a:effectLst/>
-                          <a:latin typeface="Times New Roman" panose="02020603050405020304" pitchFamily="18" charset="0"/>
-                          <a:cs typeface="Times New Roman" panose="02020603050405020304" pitchFamily="18" charset="0"/>
-                        </a:rPr>
-                        <a:t>10</a:t>
-                      </a:r>
-                      <a:endParaRPr lang="en-US" sz="900">
-                        <a:effectLst/>
-                        <a:latin typeface="Times New Roman" panose="02020603050405020304" pitchFamily="18" charset="0"/>
-                        <a:ea typeface="Arial" panose="020B0604020202020204" pitchFamily="34" charset="0"/>
-                        <a:cs typeface="Times New Roman" panose="02020603050405020304" pitchFamily="18" charset="0"/>
-                      </a:endParaRPr>
-                    </a:p>
-                  </a:txBody>
-                  <a:tcPr marL="27992" marR="27992" marT="0" marB="0" anchor="ctr"/>
-                </a:tc>
-                <a:tc>
-                  <a:txBody>
-                    <a:bodyPr/>
-                    <a:lstStyle/>
-                    <a:p>
-                      <a:pPr marL="0" marR="0">
-                        <a:lnSpc>
-                          <a:spcPct val="107000"/>
-                        </a:lnSpc>
-                        <a:spcBef>
-                          <a:spcPts val="0"/>
-                        </a:spcBef>
-                        <a:spcAft>
-                          <a:spcPts val="0"/>
-                        </a:spcAft>
-                      </a:pPr>
-                      <a:r>
-                        <a:rPr lang="en-US" sz="1050" dirty="0" err="1">
-                          <a:effectLst/>
-                          <a:latin typeface="Times New Roman" panose="02020603050405020304" pitchFamily="18" charset="0"/>
-                          <a:cs typeface="Times New Roman" panose="02020603050405020304" pitchFamily="18" charset="0"/>
-                        </a:rPr>
-                        <a:t>Là</a:t>
-                      </a:r>
-                      <a:r>
-                        <a:rPr lang="en-US" sz="1050" dirty="0">
-                          <a:effectLst/>
-                          <a:latin typeface="Times New Roman" panose="02020603050405020304" pitchFamily="18" charset="0"/>
-                          <a:cs typeface="Times New Roman" panose="02020603050405020304" pitchFamily="18" charset="0"/>
-                        </a:rPr>
-                        <a:t> </a:t>
-                      </a:r>
-                      <a:r>
-                        <a:rPr lang="en-US" sz="1050" dirty="0" err="1">
-                          <a:effectLst/>
-                          <a:latin typeface="Times New Roman" panose="02020603050405020304" pitchFamily="18" charset="0"/>
-                          <a:cs typeface="Times New Roman" panose="02020603050405020304" pitchFamily="18" charset="0"/>
-                        </a:rPr>
-                        <a:t>người</a:t>
-                      </a:r>
-                      <a:r>
-                        <a:rPr lang="en-US" sz="1050" dirty="0">
-                          <a:effectLst/>
-                          <a:latin typeface="Times New Roman" panose="02020603050405020304" pitchFamily="18" charset="0"/>
-                          <a:cs typeface="Times New Roman" panose="02020603050405020304" pitchFamily="18" charset="0"/>
-                        </a:rPr>
-                        <a:t> </a:t>
-                      </a:r>
-                      <a:r>
-                        <a:rPr lang="en-US" sz="1050" dirty="0" err="1">
-                          <a:effectLst/>
-                          <a:latin typeface="Times New Roman" panose="02020603050405020304" pitchFamily="18" charset="0"/>
-                          <a:cs typeface="Times New Roman" panose="02020603050405020304" pitchFamily="18" charset="0"/>
-                        </a:rPr>
-                        <a:t>dùng</a:t>
-                      </a:r>
-                      <a:r>
-                        <a:rPr lang="en-US" sz="1050" dirty="0">
-                          <a:effectLst/>
-                          <a:latin typeface="Times New Roman" panose="02020603050405020304" pitchFamily="18" charset="0"/>
-                          <a:cs typeface="Times New Roman" panose="02020603050405020304" pitchFamily="18" charset="0"/>
-                        </a:rPr>
-                        <a:t> </a:t>
-                      </a:r>
-                      <a:r>
-                        <a:rPr lang="en-US" sz="1050" dirty="0" err="1">
-                          <a:effectLst/>
-                          <a:latin typeface="Times New Roman" panose="02020603050405020304" pitchFamily="18" charset="0"/>
-                          <a:cs typeface="Times New Roman" panose="02020603050405020304" pitchFamily="18" charset="0"/>
-                        </a:rPr>
-                        <a:t>tôi</a:t>
-                      </a:r>
-                      <a:r>
-                        <a:rPr lang="en-US" sz="1050" dirty="0">
-                          <a:effectLst/>
-                          <a:latin typeface="Times New Roman" panose="02020603050405020304" pitchFamily="18" charset="0"/>
-                          <a:cs typeface="Times New Roman" panose="02020603050405020304" pitchFamily="18" charset="0"/>
-                        </a:rPr>
-                        <a:t> </a:t>
-                      </a:r>
-                      <a:r>
-                        <a:rPr lang="en-US" sz="1050" dirty="0" err="1">
-                          <a:effectLst/>
-                          <a:latin typeface="Times New Roman" panose="02020603050405020304" pitchFamily="18" charset="0"/>
-                          <a:cs typeface="Times New Roman" panose="02020603050405020304" pitchFamily="18" charset="0"/>
-                        </a:rPr>
-                        <a:t>muốn</a:t>
-                      </a:r>
-                      <a:r>
-                        <a:rPr lang="en-US" sz="1050" dirty="0">
-                          <a:effectLst/>
-                          <a:latin typeface="Times New Roman" panose="02020603050405020304" pitchFamily="18" charset="0"/>
-                          <a:cs typeface="Times New Roman" panose="02020603050405020304" pitchFamily="18" charset="0"/>
-                        </a:rPr>
-                        <a:t> </a:t>
-                      </a:r>
-                      <a:r>
-                        <a:rPr lang="en-US" sz="1050" dirty="0" err="1">
-                          <a:effectLst/>
-                          <a:latin typeface="Times New Roman" panose="02020603050405020304" pitchFamily="18" charset="0"/>
-                          <a:cs typeface="Times New Roman" panose="02020603050405020304" pitchFamily="18" charset="0"/>
-                        </a:rPr>
-                        <a:t>tính</a:t>
-                      </a:r>
-                      <a:r>
-                        <a:rPr lang="en-US" sz="1050" dirty="0">
-                          <a:effectLst/>
-                          <a:latin typeface="Times New Roman" panose="02020603050405020304" pitchFamily="18" charset="0"/>
-                          <a:cs typeface="Times New Roman" panose="02020603050405020304" pitchFamily="18" charset="0"/>
-                        </a:rPr>
-                        <a:t> </a:t>
-                      </a:r>
-                      <a:r>
-                        <a:rPr lang="en-US" sz="1050" dirty="0" err="1">
-                          <a:effectLst/>
-                          <a:latin typeface="Times New Roman" panose="02020603050405020304" pitchFamily="18" charset="0"/>
-                          <a:cs typeface="Times New Roman" panose="02020603050405020304" pitchFamily="18" charset="0"/>
-                        </a:rPr>
-                        <a:t>năng</a:t>
-                      </a:r>
-                      <a:r>
-                        <a:rPr lang="en-US" sz="1050" dirty="0">
-                          <a:effectLst/>
-                          <a:latin typeface="Times New Roman" panose="02020603050405020304" pitchFamily="18" charset="0"/>
-                          <a:cs typeface="Times New Roman" panose="02020603050405020304" pitchFamily="18" charset="0"/>
-                        </a:rPr>
-                        <a:t> </a:t>
-                      </a:r>
-                      <a:r>
-                        <a:rPr lang="en-US" sz="1050" dirty="0" err="1">
-                          <a:effectLst/>
-                          <a:latin typeface="Times New Roman" panose="02020603050405020304" pitchFamily="18" charset="0"/>
-                          <a:cs typeface="Times New Roman" panose="02020603050405020304" pitchFamily="18" charset="0"/>
-                        </a:rPr>
-                        <a:t>theo</a:t>
-                      </a:r>
-                      <a:r>
-                        <a:rPr lang="en-US" sz="1050" dirty="0">
-                          <a:effectLst/>
-                          <a:latin typeface="Times New Roman" panose="02020603050405020304" pitchFamily="18" charset="0"/>
-                          <a:cs typeface="Times New Roman" panose="02020603050405020304" pitchFamily="18" charset="0"/>
-                        </a:rPr>
-                        <a:t> </a:t>
-                      </a:r>
-                      <a:r>
-                        <a:rPr lang="en-US" sz="1050" dirty="0" err="1">
-                          <a:effectLst/>
-                          <a:latin typeface="Times New Roman" panose="02020603050405020304" pitchFamily="18" charset="0"/>
-                          <a:cs typeface="Times New Roman" panose="02020603050405020304" pitchFamily="18" charset="0"/>
-                        </a:rPr>
-                        <a:t>dõi</a:t>
-                      </a:r>
-                      <a:r>
-                        <a:rPr lang="en-US" sz="1050" dirty="0">
-                          <a:effectLst/>
-                          <a:latin typeface="Times New Roman" panose="02020603050405020304" pitchFamily="18" charset="0"/>
-                          <a:cs typeface="Times New Roman" panose="02020603050405020304" pitchFamily="18" charset="0"/>
-                        </a:rPr>
-                        <a:t> </a:t>
-                      </a:r>
-                      <a:r>
-                        <a:rPr lang="en-US" sz="1050" dirty="0" err="1">
-                          <a:effectLst/>
-                          <a:latin typeface="Times New Roman" panose="02020603050405020304" pitchFamily="18" charset="0"/>
-                          <a:cs typeface="Times New Roman" panose="02020603050405020304" pitchFamily="18" charset="0"/>
-                        </a:rPr>
-                        <a:t>quá</a:t>
-                      </a:r>
-                      <a:r>
-                        <a:rPr lang="en-US" sz="1050" dirty="0">
-                          <a:effectLst/>
-                          <a:latin typeface="Times New Roman" panose="02020603050405020304" pitchFamily="18" charset="0"/>
-                          <a:cs typeface="Times New Roman" panose="02020603050405020304" pitchFamily="18" charset="0"/>
-                        </a:rPr>
-                        <a:t> </a:t>
-                      </a:r>
-                      <a:r>
-                        <a:rPr lang="en-US" sz="1050" dirty="0" err="1">
-                          <a:effectLst/>
-                          <a:latin typeface="Times New Roman" panose="02020603050405020304" pitchFamily="18" charset="0"/>
-                          <a:cs typeface="Times New Roman" panose="02020603050405020304" pitchFamily="18" charset="0"/>
-                        </a:rPr>
-                        <a:t>trình</a:t>
-                      </a:r>
-                      <a:r>
-                        <a:rPr lang="en-US" sz="1050" dirty="0">
-                          <a:effectLst/>
-                          <a:latin typeface="Times New Roman" panose="02020603050405020304" pitchFamily="18" charset="0"/>
-                          <a:cs typeface="Times New Roman" panose="02020603050405020304" pitchFamily="18" charset="0"/>
-                        </a:rPr>
-                        <a:t> </a:t>
-                      </a:r>
-                      <a:r>
-                        <a:rPr lang="en-US" sz="1050" dirty="0" err="1">
-                          <a:effectLst/>
-                          <a:latin typeface="Times New Roman" panose="02020603050405020304" pitchFamily="18" charset="0"/>
-                          <a:cs typeface="Times New Roman" panose="02020603050405020304" pitchFamily="18" charset="0"/>
-                        </a:rPr>
-                        <a:t>học</a:t>
-                      </a:r>
-                      <a:r>
-                        <a:rPr lang="en-US" sz="1050" dirty="0">
-                          <a:effectLst/>
-                          <a:latin typeface="Times New Roman" panose="02020603050405020304" pitchFamily="18" charset="0"/>
-                          <a:cs typeface="Times New Roman" panose="02020603050405020304" pitchFamily="18" charset="0"/>
-                        </a:rPr>
-                        <a:t> </a:t>
-                      </a:r>
-                      <a:r>
-                        <a:rPr lang="en-US" sz="1050" dirty="0" err="1">
-                          <a:effectLst/>
-                          <a:latin typeface="Times New Roman" panose="02020603050405020304" pitchFamily="18" charset="0"/>
-                          <a:cs typeface="Times New Roman" panose="02020603050405020304" pitchFamily="18" charset="0"/>
-                        </a:rPr>
-                        <a:t>của</a:t>
-                      </a:r>
-                      <a:r>
-                        <a:rPr lang="en-US" sz="1050" dirty="0">
-                          <a:effectLst/>
-                          <a:latin typeface="Times New Roman" panose="02020603050405020304" pitchFamily="18" charset="0"/>
-                          <a:cs typeface="Times New Roman" panose="02020603050405020304" pitchFamily="18" charset="0"/>
-                        </a:rPr>
-                        <a:t> </a:t>
-                      </a:r>
-                      <a:r>
-                        <a:rPr lang="en-US" sz="1050" dirty="0" err="1">
-                          <a:effectLst/>
-                          <a:latin typeface="Times New Roman" panose="02020603050405020304" pitchFamily="18" charset="0"/>
-                          <a:cs typeface="Times New Roman" panose="02020603050405020304" pitchFamily="18" charset="0"/>
-                        </a:rPr>
-                        <a:t>tôi</a:t>
-                      </a:r>
-                      <a:r>
-                        <a:rPr lang="en-US" sz="1050" dirty="0">
-                          <a:effectLst/>
-                          <a:latin typeface="Times New Roman" panose="02020603050405020304" pitchFamily="18" charset="0"/>
-                          <a:cs typeface="Times New Roman" panose="02020603050405020304" pitchFamily="18" charset="0"/>
-                        </a:rPr>
-                        <a:t> </a:t>
-                      </a:r>
-                      <a:r>
-                        <a:rPr lang="en-US" sz="1050" dirty="0" err="1">
-                          <a:effectLst/>
-                          <a:latin typeface="Times New Roman" panose="02020603050405020304" pitchFamily="18" charset="0"/>
-                          <a:cs typeface="Times New Roman" panose="02020603050405020304" pitchFamily="18" charset="0"/>
-                        </a:rPr>
-                        <a:t>để</a:t>
-                      </a:r>
-                      <a:r>
-                        <a:rPr lang="en-US" sz="1050" dirty="0">
-                          <a:effectLst/>
-                          <a:latin typeface="Times New Roman" panose="02020603050405020304" pitchFamily="18" charset="0"/>
-                          <a:cs typeface="Times New Roman" panose="02020603050405020304" pitchFamily="18" charset="0"/>
-                        </a:rPr>
-                        <a:t> </a:t>
-                      </a:r>
-                      <a:r>
-                        <a:rPr lang="en-US" sz="1050" dirty="0" err="1">
-                          <a:effectLst/>
-                          <a:latin typeface="Times New Roman" panose="02020603050405020304" pitchFamily="18" charset="0"/>
-                          <a:cs typeface="Times New Roman" panose="02020603050405020304" pitchFamily="18" charset="0"/>
-                        </a:rPr>
-                        <a:t>theo</a:t>
-                      </a:r>
-                      <a:r>
-                        <a:rPr lang="en-US" sz="1050" dirty="0">
-                          <a:effectLst/>
-                          <a:latin typeface="Times New Roman" panose="02020603050405020304" pitchFamily="18" charset="0"/>
-                          <a:cs typeface="Times New Roman" panose="02020603050405020304" pitchFamily="18" charset="0"/>
-                        </a:rPr>
-                        <a:t> </a:t>
-                      </a:r>
-                      <a:r>
-                        <a:rPr lang="en-US" sz="1050" dirty="0" err="1">
-                          <a:effectLst/>
-                          <a:latin typeface="Times New Roman" panose="02020603050405020304" pitchFamily="18" charset="0"/>
-                          <a:cs typeface="Times New Roman" panose="02020603050405020304" pitchFamily="18" charset="0"/>
-                        </a:rPr>
-                        <a:t>dõi</a:t>
-                      </a:r>
-                      <a:r>
-                        <a:rPr lang="en-US" sz="1050" dirty="0">
-                          <a:effectLst/>
-                          <a:latin typeface="Times New Roman" panose="02020603050405020304" pitchFamily="18" charset="0"/>
-                          <a:cs typeface="Times New Roman" panose="02020603050405020304" pitchFamily="18" charset="0"/>
-                        </a:rPr>
-                        <a:t> </a:t>
-                      </a:r>
-                      <a:r>
-                        <a:rPr lang="en-US" sz="1050" dirty="0" err="1">
-                          <a:effectLst/>
-                          <a:latin typeface="Times New Roman" panose="02020603050405020304" pitchFamily="18" charset="0"/>
-                          <a:cs typeface="Times New Roman" panose="02020603050405020304" pitchFamily="18" charset="0"/>
-                        </a:rPr>
-                        <a:t>tính</a:t>
-                      </a:r>
-                      <a:r>
-                        <a:rPr lang="en-US" sz="1050" dirty="0">
-                          <a:effectLst/>
-                          <a:latin typeface="Times New Roman" panose="02020603050405020304" pitchFamily="18" charset="0"/>
-                          <a:cs typeface="Times New Roman" panose="02020603050405020304" pitchFamily="18" charset="0"/>
-                        </a:rPr>
-                        <a:t> </a:t>
-                      </a:r>
-                      <a:r>
-                        <a:rPr lang="en-US" sz="1050" dirty="0" err="1">
-                          <a:effectLst/>
-                          <a:latin typeface="Times New Roman" panose="02020603050405020304" pitchFamily="18" charset="0"/>
-                          <a:cs typeface="Times New Roman" panose="02020603050405020304" pitchFamily="18" charset="0"/>
-                        </a:rPr>
-                        <a:t>chuyên</a:t>
-                      </a:r>
-                      <a:r>
-                        <a:rPr lang="en-US" sz="1050" dirty="0">
-                          <a:effectLst/>
-                          <a:latin typeface="Times New Roman" panose="02020603050405020304" pitchFamily="18" charset="0"/>
-                          <a:cs typeface="Times New Roman" panose="02020603050405020304" pitchFamily="18" charset="0"/>
-                        </a:rPr>
-                        <a:t> </a:t>
-                      </a:r>
-                      <a:r>
-                        <a:rPr lang="en-US" sz="1050" dirty="0" err="1">
-                          <a:effectLst/>
-                          <a:latin typeface="Times New Roman" panose="02020603050405020304" pitchFamily="18" charset="0"/>
-                          <a:cs typeface="Times New Roman" panose="02020603050405020304" pitchFamily="18" charset="0"/>
-                        </a:rPr>
-                        <a:t>cần</a:t>
+                        <a:rPr lang="en-US" sz="900" dirty="0" smtClean="0">
+                          <a:effectLst/>
+                          <a:latin typeface="Times New Roman" panose="02020603050405020304" pitchFamily="18" charset="0"/>
+                          <a:ea typeface="Arial" panose="020B0604020202020204" pitchFamily="34" charset="0"/>
+                          <a:cs typeface="Times New Roman" panose="02020603050405020304" pitchFamily="18" charset="0"/>
+                        </a:rPr>
+                        <a:t>9</a:t>
                       </a:r>
                       <a:endParaRPr lang="en-US" sz="900" dirty="0">
                         <a:effectLst/>
@@ -16205,13 +15840,359 @@
                       </a:endParaRPr>
                     </a:p>
                   </a:txBody>
-                  <a:tcPr marL="27992" marR="27992" marT="0" marB="0" anchor="ctr"/>
+                  <a:tcPr marL="27992" marR="27992" marT="0" marB="0" anchor="ctr">
+                    <a:solidFill>
+                      <a:srgbClr val="FFFF00"/>
+                    </a:solidFill>
+                  </a:tcPr>
                 </a:tc>
                 <a:tc>
                   <a:txBody>
                     <a:bodyPr/>
                     <a:lstStyle/>
                     <a:p>
+                      <a:pPr marL="0" marR="0">
+                        <a:lnSpc>
+                          <a:spcPct val="107000"/>
+                        </a:lnSpc>
+                        <a:spcBef>
+                          <a:spcPts val="0"/>
+                        </a:spcBef>
+                        <a:spcAft>
+                          <a:spcPts val="0"/>
+                        </a:spcAft>
+                      </a:pPr>
+                      <a:r>
+                        <a:rPr lang="en-US" sz="1050" dirty="0" err="1">
+                          <a:effectLst/>
+                          <a:latin typeface="Times New Roman" panose="02020603050405020304" pitchFamily="18" charset="0"/>
+                          <a:cs typeface="Times New Roman" panose="02020603050405020304" pitchFamily="18" charset="0"/>
+                        </a:rPr>
+                        <a:t>Là</a:t>
+                      </a:r>
+                      <a:r>
+                        <a:rPr lang="en-US" sz="1050" dirty="0">
+                          <a:effectLst/>
+                          <a:latin typeface="Times New Roman" panose="02020603050405020304" pitchFamily="18" charset="0"/>
+                          <a:cs typeface="Times New Roman" panose="02020603050405020304" pitchFamily="18" charset="0"/>
+                        </a:rPr>
+                        <a:t> </a:t>
+                      </a:r>
+                      <a:r>
+                        <a:rPr lang="en-US" sz="1050" dirty="0" err="1">
+                          <a:effectLst/>
+                          <a:latin typeface="Times New Roman" panose="02020603050405020304" pitchFamily="18" charset="0"/>
+                          <a:cs typeface="Times New Roman" panose="02020603050405020304" pitchFamily="18" charset="0"/>
+                        </a:rPr>
+                        <a:t>người</a:t>
+                      </a:r>
+                      <a:r>
+                        <a:rPr lang="en-US" sz="1050" dirty="0">
+                          <a:effectLst/>
+                          <a:latin typeface="Times New Roman" panose="02020603050405020304" pitchFamily="18" charset="0"/>
+                          <a:cs typeface="Times New Roman" panose="02020603050405020304" pitchFamily="18" charset="0"/>
+                        </a:rPr>
+                        <a:t> </a:t>
+                      </a:r>
+                      <a:r>
+                        <a:rPr lang="en-US" sz="1050" dirty="0" err="1">
+                          <a:effectLst/>
+                          <a:latin typeface="Times New Roman" panose="02020603050405020304" pitchFamily="18" charset="0"/>
+                          <a:cs typeface="Times New Roman" panose="02020603050405020304" pitchFamily="18" charset="0"/>
+                        </a:rPr>
+                        <a:t>dùng</a:t>
+                      </a:r>
+                      <a:r>
+                        <a:rPr lang="en-US" sz="1050" dirty="0">
+                          <a:effectLst/>
+                          <a:latin typeface="Times New Roman" panose="02020603050405020304" pitchFamily="18" charset="0"/>
+                          <a:cs typeface="Times New Roman" panose="02020603050405020304" pitchFamily="18" charset="0"/>
+                        </a:rPr>
+                        <a:t> </a:t>
+                      </a:r>
+                      <a:r>
+                        <a:rPr lang="en-US" sz="1050" dirty="0" err="1">
+                          <a:effectLst/>
+                          <a:latin typeface="Times New Roman" panose="02020603050405020304" pitchFamily="18" charset="0"/>
+                          <a:cs typeface="Times New Roman" panose="02020603050405020304" pitchFamily="18" charset="0"/>
+                        </a:rPr>
+                        <a:t>tôi</a:t>
+                      </a:r>
+                      <a:r>
+                        <a:rPr lang="en-US" sz="1050" dirty="0">
+                          <a:effectLst/>
+                          <a:latin typeface="Times New Roman" panose="02020603050405020304" pitchFamily="18" charset="0"/>
+                          <a:cs typeface="Times New Roman" panose="02020603050405020304" pitchFamily="18" charset="0"/>
+                        </a:rPr>
+                        <a:t> </a:t>
+                      </a:r>
+                      <a:r>
+                        <a:rPr lang="en-US" sz="1050" dirty="0" err="1">
+                          <a:effectLst/>
+                          <a:latin typeface="Times New Roman" panose="02020603050405020304" pitchFamily="18" charset="0"/>
+                          <a:cs typeface="Times New Roman" panose="02020603050405020304" pitchFamily="18" charset="0"/>
+                        </a:rPr>
+                        <a:t>muốn</a:t>
+                      </a:r>
+                      <a:r>
+                        <a:rPr lang="en-US" sz="1050" dirty="0">
+                          <a:effectLst/>
+                          <a:latin typeface="Times New Roman" panose="02020603050405020304" pitchFamily="18" charset="0"/>
+                          <a:cs typeface="Times New Roman" panose="02020603050405020304" pitchFamily="18" charset="0"/>
+                        </a:rPr>
+                        <a:t> </a:t>
+                      </a:r>
+                      <a:r>
+                        <a:rPr lang="en-US" sz="1050" dirty="0" err="1">
+                          <a:effectLst/>
+                          <a:latin typeface="Times New Roman" panose="02020603050405020304" pitchFamily="18" charset="0"/>
+                          <a:cs typeface="Times New Roman" panose="02020603050405020304" pitchFamily="18" charset="0"/>
+                        </a:rPr>
+                        <a:t>tính</a:t>
+                      </a:r>
+                      <a:r>
+                        <a:rPr lang="en-US" sz="1050" dirty="0">
+                          <a:effectLst/>
+                          <a:latin typeface="Times New Roman" panose="02020603050405020304" pitchFamily="18" charset="0"/>
+                          <a:cs typeface="Times New Roman" panose="02020603050405020304" pitchFamily="18" charset="0"/>
+                        </a:rPr>
+                        <a:t> </a:t>
+                      </a:r>
+                      <a:r>
+                        <a:rPr lang="en-US" sz="1050" dirty="0" err="1">
+                          <a:effectLst/>
+                          <a:latin typeface="Times New Roman" panose="02020603050405020304" pitchFamily="18" charset="0"/>
+                          <a:cs typeface="Times New Roman" panose="02020603050405020304" pitchFamily="18" charset="0"/>
+                        </a:rPr>
+                        <a:t>năng</a:t>
+                      </a:r>
+                      <a:r>
+                        <a:rPr lang="en-US" sz="1050" dirty="0">
+                          <a:effectLst/>
+                          <a:latin typeface="Times New Roman" panose="02020603050405020304" pitchFamily="18" charset="0"/>
+                          <a:cs typeface="Times New Roman" panose="02020603050405020304" pitchFamily="18" charset="0"/>
+                        </a:rPr>
+                        <a:t> </a:t>
+                      </a:r>
+                      <a:r>
+                        <a:rPr lang="en-US" sz="1050" dirty="0" err="1">
+                          <a:effectLst/>
+                          <a:latin typeface="Times New Roman" panose="02020603050405020304" pitchFamily="18" charset="0"/>
+                          <a:cs typeface="Times New Roman" panose="02020603050405020304" pitchFamily="18" charset="0"/>
+                        </a:rPr>
+                        <a:t>theo</a:t>
+                      </a:r>
+                      <a:r>
+                        <a:rPr lang="en-US" sz="1050" dirty="0">
+                          <a:effectLst/>
+                          <a:latin typeface="Times New Roman" panose="02020603050405020304" pitchFamily="18" charset="0"/>
+                          <a:cs typeface="Times New Roman" panose="02020603050405020304" pitchFamily="18" charset="0"/>
+                        </a:rPr>
+                        <a:t> </a:t>
+                      </a:r>
+                      <a:r>
+                        <a:rPr lang="en-US" sz="1050" dirty="0" err="1">
+                          <a:effectLst/>
+                          <a:latin typeface="Times New Roman" panose="02020603050405020304" pitchFamily="18" charset="0"/>
+                          <a:cs typeface="Times New Roman" panose="02020603050405020304" pitchFamily="18" charset="0"/>
+                        </a:rPr>
+                        <a:t>dõi</a:t>
+                      </a:r>
+                      <a:r>
+                        <a:rPr lang="en-US" sz="1050" dirty="0">
+                          <a:effectLst/>
+                          <a:latin typeface="Times New Roman" panose="02020603050405020304" pitchFamily="18" charset="0"/>
+                          <a:cs typeface="Times New Roman" panose="02020603050405020304" pitchFamily="18" charset="0"/>
+                        </a:rPr>
+                        <a:t> </a:t>
+                      </a:r>
+                      <a:r>
+                        <a:rPr lang="en-US" sz="1050" dirty="0" err="1">
+                          <a:effectLst/>
+                          <a:latin typeface="Times New Roman" panose="02020603050405020304" pitchFamily="18" charset="0"/>
+                          <a:cs typeface="Times New Roman" panose="02020603050405020304" pitchFamily="18" charset="0"/>
+                        </a:rPr>
+                        <a:t>quá</a:t>
+                      </a:r>
+                      <a:r>
+                        <a:rPr lang="en-US" sz="1050" dirty="0">
+                          <a:effectLst/>
+                          <a:latin typeface="Times New Roman" panose="02020603050405020304" pitchFamily="18" charset="0"/>
+                          <a:cs typeface="Times New Roman" panose="02020603050405020304" pitchFamily="18" charset="0"/>
+                        </a:rPr>
+                        <a:t> </a:t>
+                      </a:r>
+                      <a:r>
+                        <a:rPr lang="en-US" sz="1050" dirty="0" err="1">
+                          <a:effectLst/>
+                          <a:latin typeface="Times New Roman" panose="02020603050405020304" pitchFamily="18" charset="0"/>
+                          <a:cs typeface="Times New Roman" panose="02020603050405020304" pitchFamily="18" charset="0"/>
+                        </a:rPr>
+                        <a:t>trình</a:t>
+                      </a:r>
+                      <a:r>
+                        <a:rPr lang="en-US" sz="1050" dirty="0">
+                          <a:effectLst/>
+                          <a:latin typeface="Times New Roman" panose="02020603050405020304" pitchFamily="18" charset="0"/>
+                          <a:cs typeface="Times New Roman" panose="02020603050405020304" pitchFamily="18" charset="0"/>
+                        </a:rPr>
+                        <a:t> </a:t>
+                      </a:r>
+                      <a:r>
+                        <a:rPr lang="en-US" sz="1050" dirty="0" err="1">
+                          <a:effectLst/>
+                          <a:latin typeface="Times New Roman" panose="02020603050405020304" pitchFamily="18" charset="0"/>
+                          <a:cs typeface="Times New Roman" panose="02020603050405020304" pitchFamily="18" charset="0"/>
+                        </a:rPr>
+                        <a:t>học</a:t>
+                      </a:r>
+                      <a:r>
+                        <a:rPr lang="en-US" sz="1050" dirty="0">
+                          <a:effectLst/>
+                          <a:latin typeface="Times New Roman" panose="02020603050405020304" pitchFamily="18" charset="0"/>
+                          <a:cs typeface="Times New Roman" panose="02020603050405020304" pitchFamily="18" charset="0"/>
+                        </a:rPr>
+                        <a:t> </a:t>
+                      </a:r>
+                      <a:r>
+                        <a:rPr lang="en-US" sz="1050" dirty="0" err="1">
+                          <a:effectLst/>
+                          <a:latin typeface="Times New Roman" panose="02020603050405020304" pitchFamily="18" charset="0"/>
+                          <a:cs typeface="Times New Roman" panose="02020603050405020304" pitchFamily="18" charset="0"/>
+                        </a:rPr>
+                        <a:t>của</a:t>
+                      </a:r>
+                      <a:r>
+                        <a:rPr lang="en-US" sz="1050" dirty="0">
+                          <a:effectLst/>
+                          <a:latin typeface="Times New Roman" panose="02020603050405020304" pitchFamily="18" charset="0"/>
+                          <a:cs typeface="Times New Roman" panose="02020603050405020304" pitchFamily="18" charset="0"/>
+                        </a:rPr>
+                        <a:t> </a:t>
+                      </a:r>
+                      <a:r>
+                        <a:rPr lang="en-US" sz="1050" dirty="0" err="1">
+                          <a:effectLst/>
+                          <a:latin typeface="Times New Roman" panose="02020603050405020304" pitchFamily="18" charset="0"/>
+                          <a:cs typeface="Times New Roman" panose="02020603050405020304" pitchFamily="18" charset="0"/>
+                        </a:rPr>
+                        <a:t>tôi</a:t>
+                      </a:r>
+                      <a:r>
+                        <a:rPr lang="en-US" sz="1050" dirty="0">
+                          <a:effectLst/>
+                          <a:latin typeface="Times New Roman" panose="02020603050405020304" pitchFamily="18" charset="0"/>
+                          <a:cs typeface="Times New Roman" panose="02020603050405020304" pitchFamily="18" charset="0"/>
+                        </a:rPr>
+                        <a:t> </a:t>
+                      </a:r>
+                      <a:r>
+                        <a:rPr lang="en-US" sz="1050" dirty="0" err="1">
+                          <a:effectLst/>
+                          <a:latin typeface="Times New Roman" panose="02020603050405020304" pitchFamily="18" charset="0"/>
+                          <a:cs typeface="Times New Roman" panose="02020603050405020304" pitchFamily="18" charset="0"/>
+                        </a:rPr>
+                        <a:t>để</a:t>
+                      </a:r>
+                      <a:r>
+                        <a:rPr lang="en-US" sz="1050" dirty="0">
+                          <a:effectLst/>
+                          <a:latin typeface="Times New Roman" panose="02020603050405020304" pitchFamily="18" charset="0"/>
+                          <a:cs typeface="Times New Roman" panose="02020603050405020304" pitchFamily="18" charset="0"/>
+                        </a:rPr>
+                        <a:t> </a:t>
+                      </a:r>
+                      <a:r>
+                        <a:rPr lang="en-US" sz="1050" dirty="0" err="1">
+                          <a:effectLst/>
+                          <a:latin typeface="Times New Roman" panose="02020603050405020304" pitchFamily="18" charset="0"/>
+                          <a:cs typeface="Times New Roman" panose="02020603050405020304" pitchFamily="18" charset="0"/>
+                        </a:rPr>
+                        <a:t>theo</a:t>
+                      </a:r>
+                      <a:r>
+                        <a:rPr lang="en-US" sz="1050" dirty="0">
+                          <a:effectLst/>
+                          <a:latin typeface="Times New Roman" panose="02020603050405020304" pitchFamily="18" charset="0"/>
+                          <a:cs typeface="Times New Roman" panose="02020603050405020304" pitchFamily="18" charset="0"/>
+                        </a:rPr>
+                        <a:t> </a:t>
+                      </a:r>
+                      <a:r>
+                        <a:rPr lang="en-US" sz="1050" dirty="0" err="1">
+                          <a:effectLst/>
+                          <a:latin typeface="Times New Roman" panose="02020603050405020304" pitchFamily="18" charset="0"/>
+                          <a:cs typeface="Times New Roman" panose="02020603050405020304" pitchFamily="18" charset="0"/>
+                        </a:rPr>
+                        <a:t>dõi</a:t>
+                      </a:r>
+                      <a:r>
+                        <a:rPr lang="en-US" sz="1050" dirty="0">
+                          <a:effectLst/>
+                          <a:latin typeface="Times New Roman" panose="02020603050405020304" pitchFamily="18" charset="0"/>
+                          <a:cs typeface="Times New Roman" panose="02020603050405020304" pitchFamily="18" charset="0"/>
+                        </a:rPr>
+                        <a:t> </a:t>
+                      </a:r>
+                      <a:r>
+                        <a:rPr lang="en-US" sz="1050" dirty="0" err="1">
+                          <a:effectLst/>
+                          <a:latin typeface="Times New Roman" panose="02020603050405020304" pitchFamily="18" charset="0"/>
+                          <a:cs typeface="Times New Roman" panose="02020603050405020304" pitchFamily="18" charset="0"/>
+                        </a:rPr>
+                        <a:t>tính</a:t>
+                      </a:r>
+                      <a:r>
+                        <a:rPr lang="en-US" sz="1050" dirty="0">
+                          <a:effectLst/>
+                          <a:latin typeface="Times New Roman" panose="02020603050405020304" pitchFamily="18" charset="0"/>
+                          <a:cs typeface="Times New Roman" panose="02020603050405020304" pitchFamily="18" charset="0"/>
+                        </a:rPr>
+                        <a:t> </a:t>
+                      </a:r>
+                      <a:r>
+                        <a:rPr lang="en-US" sz="1050" dirty="0" err="1">
+                          <a:effectLst/>
+                          <a:latin typeface="Times New Roman" panose="02020603050405020304" pitchFamily="18" charset="0"/>
+                          <a:cs typeface="Times New Roman" panose="02020603050405020304" pitchFamily="18" charset="0"/>
+                        </a:rPr>
+                        <a:t>chuyên</a:t>
+                      </a:r>
+                      <a:r>
+                        <a:rPr lang="en-US" sz="1050" dirty="0">
+                          <a:effectLst/>
+                          <a:latin typeface="Times New Roman" panose="02020603050405020304" pitchFamily="18" charset="0"/>
+                          <a:cs typeface="Times New Roman" panose="02020603050405020304" pitchFamily="18" charset="0"/>
+                        </a:rPr>
+                        <a:t> </a:t>
+                      </a:r>
+                      <a:r>
+                        <a:rPr lang="en-US" sz="1050" dirty="0" err="1">
+                          <a:effectLst/>
+                          <a:latin typeface="Times New Roman" panose="02020603050405020304" pitchFamily="18" charset="0"/>
+                          <a:cs typeface="Times New Roman" panose="02020603050405020304" pitchFamily="18" charset="0"/>
+                        </a:rPr>
+                        <a:t>cần</a:t>
+                      </a:r>
+                      <a:endParaRPr lang="en-US" sz="900" dirty="0">
+                        <a:effectLst/>
+                        <a:latin typeface="Times New Roman" panose="02020603050405020304" pitchFamily="18" charset="0"/>
+                        <a:ea typeface="Arial" panose="020B0604020202020204" pitchFamily="34" charset="0"/>
+                        <a:cs typeface="Times New Roman" panose="02020603050405020304" pitchFamily="18" charset="0"/>
+                      </a:endParaRPr>
+                    </a:p>
+                  </a:txBody>
+                  <a:tcPr marL="27992" marR="27992" marT="0" marB="0" anchor="ctr">
+                    <a:solidFill>
+                      <a:srgbClr val="FFFF00"/>
+                    </a:solidFill>
+                  </a:tcPr>
+                </a:tc>
+                <a:tc>
+                  <a:txBody>
+                    <a:bodyPr/>
+                    <a:lstStyle/>
+                    <a:p>
                       <a:pPr marL="0" marR="0" algn="ctr">
                         <a:lnSpc>
                           <a:spcPct val="107000"/>
@@ -16224,14 +16205,14 @@
                         </a:spcAft>
                       </a:pPr>
                       <a:r>
-                        <a:rPr lang="en-US" sz="1000">
+                        <a:rPr lang="en-US" sz="1000" dirty="0">
                           <a:effectLst/>
                           <a:latin typeface="Times New Roman" panose="02020603050405020304" pitchFamily="18" charset="0"/>
                           <a:cs typeface="Times New Roman" panose="02020603050405020304" pitchFamily="18" charset="0"/>
                         </a:rPr>
                         <a:t>5</a:t>
                       </a:r>
-                      <a:endParaRPr lang="en-US" sz="900">
+                      <a:endParaRPr lang="en-US" sz="900" dirty="0">
                         <a:effectLst/>
                         <a:latin typeface="Times New Roman" panose="02020603050405020304" pitchFamily="18" charset="0"/>
                         <a:ea typeface="Arial" panose="020B0604020202020204" pitchFamily="34" charset="0"/>
@@ -16239,7 +16220,11 @@
                       </a:endParaRPr>
                     </a:p>
                   </a:txBody>
-                  <a:tcPr marL="27992" marR="27992" marT="0" marB="0" anchor="ctr"/>
+                  <a:tcPr marL="27992" marR="27992" marT="0" marB="0" anchor="ctr">
+                    <a:solidFill>
+                      <a:srgbClr val="FFFF00"/>
+                    </a:solidFill>
+                  </a:tcPr>
                 </a:tc>
                 <a:extLst>
                   <a:ext uri="{0D108BD9-81ED-4DB2-BD59-A6C34878D82A}">
@@ -16265,14 +16250,14 @@
                         </a:spcAft>
                       </a:pPr>
                       <a:r>
-                        <a:rPr lang="en-US" sz="1100">
-                          <a:effectLst/>
-                          <a:latin typeface="Times New Roman" panose="02020603050405020304" pitchFamily="18" charset="0"/>
-                          <a:cs typeface="Times New Roman" panose="02020603050405020304" pitchFamily="18" charset="0"/>
-                        </a:rPr>
-                        <a:t>11</a:t>
-                      </a:r>
-                      <a:endParaRPr lang="en-US" sz="900">
+                        <a:rPr lang="en-US" sz="1100" dirty="0" smtClean="0">
+                          <a:effectLst/>
+                          <a:latin typeface="Times New Roman" panose="02020603050405020304" pitchFamily="18" charset="0"/>
+                          <a:cs typeface="Times New Roman" panose="02020603050405020304" pitchFamily="18" charset="0"/>
+                        </a:rPr>
+                        <a:t>10</a:t>
+                      </a:r>
+                      <a:endParaRPr lang="en-US" sz="900" dirty="0">
                         <a:effectLst/>
                         <a:latin typeface="Times New Roman" panose="02020603050405020304" pitchFamily="18" charset="0"/>
                         <a:ea typeface="Arial" panose="020B0604020202020204" pitchFamily="34" charset="0"/>
@@ -16374,14 +16359,14 @@
                         </a:spcAft>
                       </a:pPr>
                       <a:r>
-                        <a:rPr lang="en-US" sz="1100">
-                          <a:effectLst/>
-                          <a:latin typeface="Times New Roman" panose="02020603050405020304" pitchFamily="18" charset="0"/>
-                          <a:cs typeface="Times New Roman" panose="02020603050405020304" pitchFamily="18" charset="0"/>
-                        </a:rPr>
-                        <a:t>12</a:t>
-                      </a:r>
-                      <a:endParaRPr lang="en-US" sz="900">
+                        <a:rPr lang="en-US" sz="1100" dirty="0" smtClean="0">
+                          <a:effectLst/>
+                          <a:latin typeface="Times New Roman" panose="02020603050405020304" pitchFamily="18" charset="0"/>
+                          <a:cs typeface="Times New Roman" panose="02020603050405020304" pitchFamily="18" charset="0"/>
+                        </a:rPr>
+                        <a:t>11</a:t>
+                      </a:r>
+                      <a:endParaRPr lang="en-US" sz="900" dirty="0">
                         <a:effectLst/>
                         <a:latin typeface="Times New Roman" panose="02020603050405020304" pitchFamily="18" charset="0"/>
                         <a:ea typeface="Arial" panose="020B0604020202020204" pitchFamily="34" charset="0"/>
@@ -16442,14 +16427,14 @@
                         </a:spcAft>
                       </a:pPr>
                       <a:r>
-                        <a:rPr lang="en-US" sz="1000">
+                        <a:rPr lang="en-US" sz="1000" dirty="0">
                           <a:effectLst/>
                           <a:latin typeface="Times New Roman" panose="02020603050405020304" pitchFamily="18" charset="0"/>
                           <a:cs typeface="Times New Roman" panose="02020603050405020304" pitchFamily="18" charset="0"/>
                         </a:rPr>
                         <a:t>1</a:t>
                       </a:r>
-                      <a:endParaRPr lang="en-US" sz="900">
+                      <a:endParaRPr lang="en-US" sz="900" dirty="0">
                         <a:effectLst/>
                         <a:latin typeface="Times New Roman" panose="02020603050405020304" pitchFamily="18" charset="0"/>
                         <a:ea typeface="Arial" panose="020B0604020202020204" pitchFamily="34" charset="0"/>
@@ -16483,14 +16468,14 @@
                         </a:spcAft>
                       </a:pPr>
                       <a:r>
-                        <a:rPr lang="en-US" sz="1100">
-                          <a:effectLst/>
-                          <a:latin typeface="Times New Roman" panose="02020603050405020304" pitchFamily="18" charset="0"/>
-                          <a:cs typeface="Times New Roman" panose="02020603050405020304" pitchFamily="18" charset="0"/>
-                        </a:rPr>
-                        <a:t>13</a:t>
-                      </a:r>
-                      <a:endParaRPr lang="en-US" sz="900">
+                        <a:rPr lang="en-US" sz="1100" dirty="0" smtClean="0">
+                          <a:effectLst/>
+                          <a:latin typeface="Times New Roman" panose="02020603050405020304" pitchFamily="18" charset="0"/>
+                          <a:cs typeface="Times New Roman" panose="02020603050405020304" pitchFamily="18" charset="0"/>
+                        </a:rPr>
+                        <a:t>12</a:t>
+                      </a:r>
+                      <a:endParaRPr lang="en-US" sz="900" dirty="0">
                         <a:effectLst/>
                         <a:latin typeface="Times New Roman" panose="02020603050405020304" pitchFamily="18" charset="0"/>
                         <a:ea typeface="Arial" panose="020B0604020202020204" pitchFamily="34" charset="0"/>
@@ -16551,14 +16536,14 @@
                         </a:spcAft>
                       </a:pPr>
                       <a:r>
-                        <a:rPr lang="en-US" sz="1000">
+                        <a:rPr lang="en-US" sz="1000" dirty="0">
                           <a:effectLst/>
                           <a:latin typeface="Times New Roman" panose="02020603050405020304" pitchFamily="18" charset="0"/>
                           <a:cs typeface="Times New Roman" panose="02020603050405020304" pitchFamily="18" charset="0"/>
                         </a:rPr>
                         <a:t>1</a:t>
                       </a:r>
-                      <a:endParaRPr lang="en-US" sz="900">
+                      <a:endParaRPr lang="en-US" sz="900" dirty="0">
                         <a:effectLst/>
                         <a:latin typeface="Times New Roman" panose="02020603050405020304" pitchFamily="18" charset="0"/>
                         <a:ea typeface="Arial" panose="020B0604020202020204" pitchFamily="34" charset="0"/>
@@ -16592,14 +16577,14 @@
                         </a:spcAft>
                       </a:pPr>
                       <a:r>
-                        <a:rPr lang="en-US" sz="1100">
-                          <a:effectLst/>
-                          <a:latin typeface="Times New Roman" panose="02020603050405020304" pitchFamily="18" charset="0"/>
-                          <a:cs typeface="Times New Roman" panose="02020603050405020304" pitchFamily="18" charset="0"/>
-                        </a:rPr>
-                        <a:t>14</a:t>
-                      </a:r>
-                      <a:endParaRPr lang="en-US" sz="900">
+                        <a:rPr lang="en-US" sz="1100" dirty="0" smtClean="0">
+                          <a:effectLst/>
+                          <a:latin typeface="Times New Roman" panose="02020603050405020304" pitchFamily="18" charset="0"/>
+                          <a:cs typeface="Times New Roman" panose="02020603050405020304" pitchFamily="18" charset="0"/>
+                        </a:rPr>
+                        <a:t>13</a:t>
+                      </a:r>
+                      <a:endParaRPr lang="en-US" sz="900" dirty="0">
                         <a:effectLst/>
                         <a:latin typeface="Times New Roman" panose="02020603050405020304" pitchFamily="18" charset="0"/>
                         <a:ea typeface="Arial" panose="020B0604020202020204" pitchFamily="34" charset="0"/>
@@ -16701,14 +16686,14 @@
                         </a:spcAft>
                       </a:pPr>
                       <a:r>
-                        <a:rPr lang="en-US" sz="1100">
-                          <a:effectLst/>
-                          <a:latin typeface="Times New Roman" panose="02020603050405020304" pitchFamily="18" charset="0"/>
-                          <a:cs typeface="Times New Roman" panose="02020603050405020304" pitchFamily="18" charset="0"/>
-                        </a:rPr>
-                        <a:t>15</a:t>
-                      </a:r>
-                      <a:endParaRPr lang="en-US" sz="900">
+                        <a:rPr lang="en-US" sz="1100" dirty="0" smtClean="0">
+                          <a:effectLst/>
+                          <a:latin typeface="Times New Roman" panose="02020603050405020304" pitchFamily="18" charset="0"/>
+                          <a:cs typeface="Times New Roman" panose="02020603050405020304" pitchFamily="18" charset="0"/>
+                        </a:rPr>
+                        <a:t>14</a:t>
+                      </a:r>
+                      <a:endParaRPr lang="en-US" sz="900" dirty="0">
                         <a:effectLst/>
                         <a:latin typeface="Times New Roman" panose="02020603050405020304" pitchFamily="18" charset="0"/>
                         <a:ea typeface="Arial" panose="020B0604020202020204" pitchFamily="34" charset="0"/>
@@ -16735,14 +16720,14 @@
                         </a:spcAft>
                       </a:pPr>
                       <a:r>
-                        <a:rPr lang="en-US" sz="1050">
+                        <a:rPr lang="en-US" sz="1050" dirty="0">
                           <a:effectLst/>
                           <a:latin typeface="Times New Roman" panose="02020603050405020304" pitchFamily="18" charset="0"/>
                           <a:cs typeface="Times New Roman" panose="02020603050405020304" pitchFamily="18" charset="0"/>
                         </a:rPr>
                         <a:t>Là người quản lý tôi muốn quản lý bài tập để quản lý các bài tập của website</a:t>
                       </a:r>
-                      <a:endParaRPr lang="en-US" sz="900">
+                      <a:endParaRPr lang="en-US" sz="900" dirty="0">
                         <a:effectLst/>
                         <a:latin typeface="Times New Roman" panose="02020603050405020304" pitchFamily="18" charset="0"/>
                         <a:ea typeface="Arial" panose="020B0604020202020204" pitchFamily="34" charset="0"/>
@@ -16810,123 +16795,14 @@
                         </a:spcAft>
                       </a:pPr>
                       <a:r>
-                        <a:rPr lang="en-US" sz="1100">
-                          <a:effectLst/>
-                          <a:latin typeface="Times New Roman" panose="02020603050405020304" pitchFamily="18" charset="0"/>
-                          <a:cs typeface="Times New Roman" panose="02020603050405020304" pitchFamily="18" charset="0"/>
-                        </a:rPr>
-                        <a:t>16</a:t>
-                      </a:r>
-                      <a:endParaRPr lang="en-US" sz="900">
-                        <a:effectLst/>
-                        <a:latin typeface="Times New Roman" panose="02020603050405020304" pitchFamily="18" charset="0"/>
-                        <a:ea typeface="Arial" panose="020B0604020202020204" pitchFamily="34" charset="0"/>
-                        <a:cs typeface="Times New Roman" panose="02020603050405020304" pitchFamily="18" charset="0"/>
-                      </a:endParaRPr>
-                    </a:p>
-                  </a:txBody>
-                  <a:tcPr marL="27992" marR="27992" marT="0" marB="0" anchor="ctr"/>
-                </a:tc>
-                <a:tc>
-                  <a:txBody>
-                    <a:bodyPr/>
-                    <a:lstStyle/>
-                    <a:p>
-                      <a:pPr marL="0" marR="0">
-                        <a:lnSpc>
-                          <a:spcPct val="107000"/>
-                        </a:lnSpc>
-                        <a:spcBef>
-                          <a:spcPts val="0"/>
-                        </a:spcBef>
-                        <a:spcAft>
-                          <a:spcPts val="0"/>
-                        </a:spcAft>
-                      </a:pPr>
-                      <a:r>
-                        <a:rPr lang="en-US" sz="1050" dirty="0">
-                          <a:effectLst/>
-                          <a:latin typeface="Times New Roman" panose="02020603050405020304" pitchFamily="18" charset="0"/>
-                          <a:cs typeface="Times New Roman" panose="02020603050405020304" pitchFamily="18" charset="0"/>
-                        </a:rPr>
-                        <a:t>Là người quản lý tôi muốn website chấm điểm tự động đểngười dùng biết điểm khi làm bài tập xong</a:t>
+                        <a:rPr lang="en-US" sz="1100" dirty="0" smtClean="0">
+                          <a:effectLst/>
+                          <a:latin typeface="Times New Roman" panose="02020603050405020304" pitchFamily="18" charset="0"/>
+                          <a:cs typeface="Times New Roman" panose="02020603050405020304" pitchFamily="18" charset="0"/>
+                        </a:rPr>
+                        <a:t>15</a:t>
                       </a:r>
                       <a:endParaRPr lang="en-US" sz="900" dirty="0">
-                        <a:effectLst/>
-                        <a:latin typeface="Times New Roman" panose="02020603050405020304" pitchFamily="18" charset="0"/>
-                        <a:ea typeface="Arial" panose="020B0604020202020204" pitchFamily="34" charset="0"/>
-                        <a:cs typeface="Times New Roman" panose="02020603050405020304" pitchFamily="18" charset="0"/>
-                      </a:endParaRPr>
-                    </a:p>
-                  </a:txBody>
-                  <a:tcPr marL="27992" marR="27992" marT="0" marB="0" anchor="ctr"/>
-                </a:tc>
-                <a:tc>
-                  <a:txBody>
-                    <a:bodyPr/>
-                    <a:lstStyle/>
-                    <a:p>
-                      <a:pPr marL="0" marR="0" algn="ctr">
-                        <a:lnSpc>
-                          <a:spcPct val="107000"/>
-                        </a:lnSpc>
-                        <a:spcBef>
-                          <a:spcPts val="0"/>
-                        </a:spcBef>
-                        <a:spcAft>
-                          <a:spcPts val="0"/>
-                        </a:spcAft>
-                      </a:pPr>
-                      <a:r>
-                        <a:rPr lang="en-US" sz="1000" dirty="0">
-                          <a:effectLst/>
-                          <a:latin typeface="Times New Roman" panose="02020603050405020304" pitchFamily="18" charset="0"/>
-                          <a:cs typeface="Times New Roman" panose="02020603050405020304" pitchFamily="18" charset="0"/>
-                        </a:rPr>
-                        <a:t>3</a:t>
-                      </a:r>
-                      <a:endParaRPr lang="en-US" sz="900" dirty="0">
-                        <a:effectLst/>
-                        <a:latin typeface="Times New Roman" panose="02020603050405020304" pitchFamily="18" charset="0"/>
-                        <a:ea typeface="Arial" panose="020B0604020202020204" pitchFamily="34" charset="0"/>
-                        <a:cs typeface="Times New Roman" panose="02020603050405020304" pitchFamily="18" charset="0"/>
-                      </a:endParaRPr>
-                    </a:p>
-                  </a:txBody>
-                  <a:tcPr marL="27992" marR="27992" marT="0" marB="0" anchor="ctr"/>
-                </a:tc>
-                <a:extLst>
-                  <a:ext uri="{0D108BD9-81ED-4DB2-BD59-A6C34878D82A}">
-                    <a16:rowId xmlns:a16="http://schemas.microsoft.com/office/drawing/2014/main" val="1802306722"/>
-                  </a:ext>
-                </a:extLst>
-              </a:tr>
-              <a:tr h="325520">
-                <a:tc>
-                  <a:txBody>
-                    <a:bodyPr/>
-                    <a:lstStyle/>
-                    <a:p>
-                      <a:pPr marL="0" marR="0" algn="ctr">
-                        <a:lnSpc>
-                          <a:spcPct val="107000"/>
-                        </a:lnSpc>
-                        <a:spcBef>
-                          <a:spcPts val="0"/>
-                        </a:spcBef>
-                        <a:spcAft>
-                          <a:spcPts val="0"/>
-                        </a:spcAft>
-                      </a:pPr>
-                      <a:r>
-                        <a:rPr lang="en-US" sz="1100">
-                          <a:effectLst/>
-                          <a:latin typeface="Times New Roman" panose="02020603050405020304" pitchFamily="18" charset="0"/>
-                          <a:cs typeface="Times New Roman" panose="02020603050405020304" pitchFamily="18" charset="0"/>
-                        </a:rPr>
-                        <a:t>17</a:t>
-                      </a:r>
-                      <a:endParaRPr lang="en-US" sz="900">
                         <a:effectLst/>
                         <a:latin typeface="Times New Roman" panose="02020603050405020304" pitchFamily="18" charset="0"/>
                         <a:ea typeface="Arial" panose="020B0604020202020204" pitchFamily="34" charset="0"/>
@@ -17394,7 +17270,7 @@
                   </a:ext>
                 </a:extLst>
               </a:tr>
-              <a:tr h="177227">
+              <a:tr h="176948">
                 <a:tc>
                   <a:txBody>
                     <a:bodyPr/>
@@ -17412,14 +17288,14 @@
                         </a:spcAft>
                       </a:pPr>
                       <a:r>
-                        <a:rPr lang="en-US" sz="1100">
-                          <a:effectLst/>
-                          <a:latin typeface="Times New Roman" panose="02020603050405020304" pitchFamily="18" charset="0"/>
-                          <a:cs typeface="Times New Roman" panose="02020603050405020304" pitchFamily="18" charset="0"/>
-                        </a:rPr>
-                        <a:t>18</a:t>
-                      </a:r>
-                      <a:endParaRPr lang="en-US" sz="900">
+                        <a:rPr lang="en-US" sz="1000" dirty="0">
+                          <a:effectLst/>
+                          <a:latin typeface="Times New Roman" panose="02020603050405020304" pitchFamily="18" charset="0"/>
+                          <a:cs typeface="Times New Roman" panose="02020603050405020304" pitchFamily="18" charset="0"/>
+                        </a:rPr>
+                        <a:t>Tổng cộng</a:t>
+                      </a:r>
+                      <a:endParaRPr lang="en-US" sz="900" dirty="0">
                         <a:effectLst/>
                         <a:latin typeface="Times New Roman" panose="02020603050405020304" pitchFamily="18" charset="0"/>
                         <a:ea typeface="Arial" panose="020B0604020202020204" pitchFamily="34" charset="0"/>
@@ -17434,7 +17310,7 @@
                     <a:bodyPr/>
                     <a:lstStyle/>
                     <a:p>
-                      <a:pPr marL="0" marR="0">
+                      <a:pPr marL="0" marR="0" algn="ctr">
                         <a:lnSpc>
                           <a:spcPct val="107000"/>
                         </a:lnSpc>
@@ -17446,14 +17322,14 @@
                         </a:spcAft>
                       </a:pPr>
                       <a:r>
-                        <a:rPr lang="en-US" sz="1050">
-                          <a:effectLst/>
-                          <a:latin typeface="Times New Roman" panose="02020603050405020304" pitchFamily="18" charset="0"/>
-                          <a:cs typeface="Times New Roman" panose="02020603050405020304" pitchFamily="18" charset="0"/>
-                        </a:rPr>
-                        <a:t>Là người quản lý tôi muốn quản lý các nhóm để quản lý điểm số, xếp hạng</a:t>
-                      </a:r>
-                      <a:endParaRPr lang="en-US" sz="900">
+                        <a:rPr lang="vi-VN" sz="1100" dirty="0">
+                          <a:effectLst/>
+                          <a:latin typeface="Times New Roman" panose="02020603050405020304" pitchFamily="18" charset="0"/>
+                          <a:cs typeface="Times New Roman" panose="02020603050405020304" pitchFamily="18" charset="0"/>
+                        </a:rPr>
+                        <a:t> </a:t>
+                      </a:r>
+                      <a:endParaRPr lang="en-US" sz="900" dirty="0">
                         <a:effectLst/>
                         <a:latin typeface="Times New Roman" panose="02020603050405020304" pitchFamily="18" charset="0"/>
                         <a:ea typeface="Arial" panose="020B0604020202020204" pitchFamily="34" charset="0"/>
@@ -17480,121 +17356,13 @@
                         </a:spcAft>
                       </a:pPr>
                       <a:r>
-                        <a:rPr lang="en-US" sz="1000" dirty="0">
-                          <a:effectLst/>
-                          <a:latin typeface="Times New Roman" panose="02020603050405020304" pitchFamily="18" charset="0"/>
-                          <a:cs typeface="Times New Roman" panose="02020603050405020304" pitchFamily="18" charset="0"/>
-                        </a:rPr>
-                        <a:t>5</a:t>
-                      </a:r>
-                      <a:endParaRPr lang="en-US" sz="900" dirty="0">
-                        <a:effectLst/>
-                        <a:latin typeface="Times New Roman" panose="02020603050405020304" pitchFamily="18" charset="0"/>
-                        <a:ea typeface="Arial" panose="020B0604020202020204" pitchFamily="34" charset="0"/>
-                        <a:cs typeface="Times New Roman" panose="02020603050405020304" pitchFamily="18" charset="0"/>
-                      </a:endParaRPr>
-                    </a:p>
-                  </a:txBody>
-                  <a:tcPr marL="27992" marR="27992" marT="0" marB="0" anchor="ctr"/>
-                </a:tc>
-                <a:extLst>
-                  <a:ext uri="{0D108BD9-81ED-4DB2-BD59-A6C34878D82A}">
-                    <a16:rowId xmlns:a16="http://schemas.microsoft.com/office/drawing/2014/main" val="2387638537"/>
-                  </a:ext>
-                </a:extLst>
-              </a:tr>
-              <a:tr h="176948">
-                <a:tc>
-                  <a:txBody>
-                    <a:bodyPr/>
-                    <a:lstStyle/>
-                    <a:p>
-                      <a:pPr marL="0" marR="0" algn="ctr">
-                        <a:lnSpc>
-                          <a:spcPct val="107000"/>
-                        </a:lnSpc>
-                        <a:spcBef>
-                          <a:spcPts val="0"/>
-                        </a:spcBef>
-                        <a:spcAft>
-                          <a:spcPts val="0"/>
-                        </a:spcAft>
-                      </a:pPr>
-                      <a:r>
-                        <a:rPr lang="en-US" sz="1000">
-                          <a:effectLst/>
-                          <a:latin typeface="Times New Roman" panose="02020603050405020304" pitchFamily="18" charset="0"/>
-                          <a:cs typeface="Times New Roman" panose="02020603050405020304" pitchFamily="18" charset="0"/>
-                        </a:rPr>
-                        <a:t>Tổng cộng</a:t>
-                      </a:r>
-                      <a:endParaRPr lang="en-US" sz="900">
-                        <a:effectLst/>
-                        <a:latin typeface="Times New Roman" panose="02020603050405020304" pitchFamily="18" charset="0"/>
-                        <a:ea typeface="Arial" panose="020B0604020202020204" pitchFamily="34" charset="0"/>
-                        <a:cs typeface="Times New Roman" panose="02020603050405020304" pitchFamily="18" charset="0"/>
-                      </a:endParaRPr>
-                    </a:p>
-                  </a:txBody>
-                  <a:tcPr marL="27992" marR="27992" marT="0" marB="0" anchor="ctr"/>
-                </a:tc>
-                <a:tc>
-                  <a:txBody>
-                    <a:bodyPr/>
-                    <a:lstStyle/>
-                    <a:p>
-                      <a:pPr marL="0" marR="0" algn="ctr">
-                        <a:lnSpc>
-                          <a:spcPct val="107000"/>
-                        </a:lnSpc>
-                        <a:spcBef>
-                          <a:spcPts val="0"/>
-                        </a:spcBef>
-                        <a:spcAft>
-                          <a:spcPts val="0"/>
-                        </a:spcAft>
-                      </a:pPr>
-                      <a:r>
-                        <a:rPr lang="vi-VN" sz="1100">
-                          <a:effectLst/>
-                          <a:latin typeface="Times New Roman" panose="02020603050405020304" pitchFamily="18" charset="0"/>
-                          <a:cs typeface="Times New Roman" panose="02020603050405020304" pitchFamily="18" charset="0"/>
-                        </a:rPr>
-                        <a:t> </a:t>
-                      </a:r>
-                      <a:endParaRPr lang="en-US" sz="900">
-                        <a:effectLst/>
-                        <a:latin typeface="Times New Roman" panose="02020603050405020304" pitchFamily="18" charset="0"/>
-                        <a:ea typeface="Arial" panose="020B0604020202020204" pitchFamily="34" charset="0"/>
-                        <a:cs typeface="Times New Roman" panose="02020603050405020304" pitchFamily="18" charset="0"/>
-                      </a:endParaRPr>
-                    </a:p>
-                  </a:txBody>
-                  <a:tcPr marL="27992" marR="27992" marT="0" marB="0" anchor="ctr"/>
-                </a:tc>
-                <a:tc>
-                  <a:txBody>
-                    <a:bodyPr/>
-                    <a:lstStyle/>
-                    <a:p>
-                      <a:pPr marL="0" marR="0" algn="ctr">
-                        <a:lnSpc>
-                          <a:spcPct val="107000"/>
-                        </a:lnSpc>
-                        <a:spcBef>
-                          <a:spcPts val="0"/>
-                        </a:spcBef>
-                        <a:spcAft>
-                          <a:spcPts val="0"/>
-                        </a:spcAft>
-                      </a:pPr>
-                      <a:r>
-                        <a:rPr lang="en-US" sz="1000" dirty="0">
-                          <a:effectLst/>
-                          <a:latin typeface="Times New Roman" panose="02020603050405020304" pitchFamily="18" charset="0"/>
-                          <a:cs typeface="Times New Roman" panose="02020603050405020304" pitchFamily="18" charset="0"/>
-                        </a:rPr>
-                        <a:t>52</a:t>
+                        <a:rPr lang="en-US" sz="1000" dirty="0" smtClean="0">
+                          <a:effectLst/>
+                          <a:latin typeface="Times New Roman" panose="02020603050405020304" pitchFamily="18" charset="0"/>
+                          <a:ea typeface="+mn-ea"/>
+                          <a:cs typeface="Times New Roman" panose="02020603050405020304" pitchFamily="18" charset="0"/>
+                        </a:rPr>
+                        <a:t>41</a:t>
                       </a:r>
                       <a:endParaRPr lang="en-US" sz="900" dirty="0">
                         <a:effectLst/>
@@ -22346,21 +22114,7 @@
                           <a:latin typeface="Times New Roman" panose="02020603050405020304" pitchFamily="18" charset="0"/>
                           <a:cs typeface="Times New Roman" panose="02020603050405020304" pitchFamily="18" charset="0"/>
                         </a:rPr>
-                        <a:t> </a:t>
-                      </a:r>
-                      <a:r>
-                        <a:rPr lang="en-US" strike="sngStrike" baseline="0" dirty="0" smtClean="0">
-                          <a:latin typeface="Times New Roman" panose="02020603050405020304" pitchFamily="18" charset="0"/>
-                          <a:cs typeface="Times New Roman" panose="02020603050405020304" pitchFamily="18" charset="0"/>
-                        </a:rPr>
-                        <a:t>kế giao </a:t>
-                      </a:r>
-                      <a:r>
-                        <a:rPr lang="en-US" strike="sngStrike" baseline="0" dirty="0" smtClean="0">
-                          <a:latin typeface="Times New Roman" panose="02020603050405020304" pitchFamily="18" charset="0"/>
-                          <a:cs typeface="Times New Roman" panose="02020603050405020304" pitchFamily="18" charset="0"/>
-                        </a:rPr>
-                        <a:t>diện </a:t>
+                        <a:t> kế giao diện </a:t>
                       </a:r>
                       <a:endParaRPr lang="en-US" strike="sngStrike" dirty="0">
                         <a:latin typeface="Times New Roman" panose="02020603050405020304" pitchFamily="18" charset="0"/>
@@ -24423,7 +24177,7 @@
                 <a16:creationId xmlns:a16="http://schemas.microsoft.com/office/drawing/2014/main" id="{F64BBAA4-C62B-4146-B49F-FE4CC4655EE0}"/>
               </a:ext>
               <a:ext uri="{C183D7F6-B498-43B3-948B-1728B52AA6E4}">
-                <adec:decorative xmlns="" xmlns:adec="http://schemas.microsoft.com/office/drawing/2017/decorative" val="1"/>
+                <adec:decorative xmlns:adec="http://schemas.microsoft.com/office/drawing/2017/decorative" xmlns="" val="1"/>
               </a:ext>
             </a:extLst>
           </p:cNvPr>
@@ -24524,7 +24278,7 @@
                 <a16:creationId xmlns:a16="http://schemas.microsoft.com/office/drawing/2014/main" id="{EEB57AA8-F021-480C-A9E2-F89913313611}"/>
               </a:ext>
               <a:ext uri="{C183D7F6-B498-43B3-948B-1728B52AA6E4}">
-                <adec:decorative xmlns="" xmlns:adec="http://schemas.microsoft.com/office/drawing/2017/decorative" val="1"/>
+                <adec:decorative xmlns:adec="http://schemas.microsoft.com/office/drawing/2017/decorative" xmlns="" val="1"/>
               </a:ext>
             </a:extLst>
           </p:cNvPr>
@@ -24614,7 +24368,7 @@
                 <a16:creationId xmlns:a16="http://schemas.microsoft.com/office/drawing/2014/main" id="{75CF30C0-9394-4459-976E-2AA223FB125F}"/>
               </a:ext>
               <a:ext uri="{C183D7F6-B498-43B3-948B-1728B52AA6E4}">
-                <adec:decorative xmlns="" xmlns:adec="http://schemas.microsoft.com/office/drawing/2017/decorative" val="1"/>
+                <adec:decorative xmlns:adec="http://schemas.microsoft.com/office/drawing/2017/decorative" xmlns="" val="1"/>
               </a:ext>
             </a:extLst>
           </p:cNvPr>
@@ -25741,7 +25495,7 @@
                 <a16:creationId xmlns:a16="http://schemas.microsoft.com/office/drawing/2014/main" id="{A8E9C91B-7EAD-4562-AB0E-DFB9663AECE3}"/>
               </a:ext>
               <a:ext uri="{C183D7F6-B498-43B3-948B-1728B52AA6E4}">
-                <adec:decorative xmlns="" xmlns:adec="http://schemas.microsoft.com/office/drawing/2017/decorative" val="1"/>
+                <adec:decorative xmlns:adec="http://schemas.microsoft.com/office/drawing/2017/decorative" xmlns="" val="1"/>
               </a:ext>
             </a:extLst>
           </p:cNvPr>

</xml_diff>